<commit_message>
Terminology correction in slides.
</commit_message>
<xml_diff>
--- a/Slides/QLS-MiCM Data Processing in Python (Part 2) Workshop PPT.pptx
+++ b/Slides/QLS-MiCM Data Processing in Python (Part 2) Workshop PPT.pptx
@@ -11831,7 +11831,7 @@
           <p:nvPr>
             <p:extLst>
               <p:ext uri="{D42A27DB-BD31-4B8C-83A1-F6EECF244321}">
-                <p14:modId xmlns:p14="http://schemas.microsoft.com/office/powerpoint/2010/main" val="1672036133"/>
+                <p14:modId xmlns:p14="http://schemas.microsoft.com/office/powerpoint/2010/main" val="1248996662"/>
               </p:ext>
             </p:extLst>
           </p:nvPr>
@@ -12380,7 +12380,7 @@
         <p:spPr>
           <a:xfrm>
             <a:off x="228600" y="165100"/>
-            <a:ext cx="6013954" cy="584775"/>
+            <a:ext cx="5952655" cy="584775"/>
           </a:xfrm>
           <a:prstGeom prst="rect">
             <a:avLst/>
@@ -12395,7 +12395,7 @@
           <a:p>
             <a:r>
               <a:rPr lang="en-CA" sz="3200" dirty="0"/>
-              <a:t>By numerical index: </a:t>
+              <a:t>By integer number: </a:t>
             </a:r>
             <a:r>
               <a:rPr lang="en-CA" sz="3200" dirty="0" err="1">

</xml_diff>

<commit_message>
Add learning objectives to slides.
</commit_message>
<xml_diff>
--- a/Slides/QLS-MiCM Data Processing in Python (Part 2) Workshop PPT.pptx
+++ b/Slides/QLS-MiCM Data Processing in Python (Part 2) Workshop PPT.pptx
@@ -5,34 +5,35 @@
     <p:sldMasterId id="2147483660" r:id="rId1"/>
   </p:sldMasterIdLst>
   <p:notesMasterIdLst>
-    <p:notesMasterId r:id="rId24"/>
+    <p:notesMasterId r:id="rId25"/>
   </p:notesMasterIdLst>
   <p:handoutMasterIdLst>
-    <p:handoutMasterId r:id="rId25"/>
+    <p:handoutMasterId r:id="rId26"/>
   </p:handoutMasterIdLst>
   <p:sldIdLst>
     <p:sldId id="316" r:id="rId2"/>
     <p:sldId id="321" r:id="rId3"/>
     <p:sldId id="338" r:id="rId4"/>
-    <p:sldId id="373" r:id="rId5"/>
-    <p:sldId id="383" r:id="rId6"/>
-    <p:sldId id="329" r:id="rId7"/>
-    <p:sldId id="366" r:id="rId8"/>
-    <p:sldId id="367" r:id="rId9"/>
-    <p:sldId id="384" r:id="rId10"/>
-    <p:sldId id="369" r:id="rId11"/>
-    <p:sldId id="385" r:id="rId12"/>
-    <p:sldId id="371" r:id="rId13"/>
-    <p:sldId id="386" r:id="rId14"/>
-    <p:sldId id="387" r:id="rId15"/>
-    <p:sldId id="375" r:id="rId16"/>
-    <p:sldId id="374" r:id="rId17"/>
-    <p:sldId id="392" r:id="rId18"/>
-    <p:sldId id="389" r:id="rId19"/>
-    <p:sldId id="390" r:id="rId20"/>
-    <p:sldId id="391" r:id="rId21"/>
-    <p:sldId id="388" r:id="rId22"/>
-    <p:sldId id="340" r:id="rId23"/>
+    <p:sldId id="393" r:id="rId5"/>
+    <p:sldId id="373" r:id="rId6"/>
+    <p:sldId id="383" r:id="rId7"/>
+    <p:sldId id="329" r:id="rId8"/>
+    <p:sldId id="366" r:id="rId9"/>
+    <p:sldId id="367" r:id="rId10"/>
+    <p:sldId id="384" r:id="rId11"/>
+    <p:sldId id="369" r:id="rId12"/>
+    <p:sldId id="385" r:id="rId13"/>
+    <p:sldId id="371" r:id="rId14"/>
+    <p:sldId id="386" r:id="rId15"/>
+    <p:sldId id="387" r:id="rId16"/>
+    <p:sldId id="375" r:id="rId17"/>
+    <p:sldId id="374" r:id="rId18"/>
+    <p:sldId id="392" r:id="rId19"/>
+    <p:sldId id="389" r:id="rId20"/>
+    <p:sldId id="390" r:id="rId21"/>
+    <p:sldId id="391" r:id="rId22"/>
+    <p:sldId id="388" r:id="rId23"/>
+    <p:sldId id="340" r:id="rId24"/>
   </p:sldIdLst>
   <p:sldSz cx="9144000" cy="6858000" type="screen4x3"/>
   <p:notesSz cx="6858000" cy="9144000"/>
@@ -972,7 +973,7 @@
           <a:p>
             <a:fld id="{DACBD60B-517C-4242-AE46-E1BD2D086542}" type="slidenum">
               <a:rPr lang="fr-FR" smtClean="0"/>
-              <a:t>6</a:t>
+              <a:t>7</a:t>
             </a:fld>
             <a:endParaRPr lang="fr-FR"/>
           </a:p>
@@ -1056,7 +1057,7 @@
           <a:p>
             <a:fld id="{DACBD60B-517C-4242-AE46-E1BD2D086542}" type="slidenum">
               <a:rPr lang="fr-FR" smtClean="0"/>
-              <a:t>22</a:t>
+              <a:t>23</a:t>
             </a:fld>
             <a:endParaRPr lang="fr-FR"/>
           </a:p>
@@ -3115,6 +3116,925 @@
                       <a:r>
                         <a:rPr lang="en-CA" sz="2500" b="1" dirty="0">
                           <a:solidFill>
+                            <a:schemeClr val="tx1"/>
+                          </a:solidFill>
+                        </a:rPr>
+                        <a:t>(0, 0)</a:t>
+                      </a:r>
+                    </a:p>
+                  </a:txBody>
+                  <a:tcPr marL="125476" marR="125476" marT="62738" marB="62738" anchor="ctr">
+                    <a:lnL w="28575" cap="flat" cmpd="sng" algn="ctr">
+                      <a:solidFill>
+                        <a:schemeClr val="tx1"/>
+                      </a:solidFill>
+                      <a:prstDash val="solid"/>
+                      <a:round/>
+                      <a:headEnd type="none" w="med" len="med"/>
+                      <a:tailEnd type="none" w="med" len="med"/>
+                    </a:lnL>
+                    <a:lnT w="28575" cap="flat" cmpd="sng" algn="ctr">
+                      <a:solidFill>
+                        <a:schemeClr val="tx1"/>
+                      </a:solidFill>
+                      <a:prstDash val="solid"/>
+                      <a:round/>
+                      <a:headEnd type="none" w="med" len="med"/>
+                      <a:tailEnd type="none" w="med" len="med"/>
+                    </a:lnT>
+                    <a:solidFill>
+                      <a:schemeClr val="tx1">
+                        <a:alpha val="19778"/>
+                      </a:schemeClr>
+                    </a:solidFill>
+                  </a:tcPr>
+                </a:tc>
+                <a:tc>
+                  <a:txBody>
+                    <a:bodyPr/>
+                    <a:lstStyle/>
+                    <a:p>
+                      <a:pPr algn="ctr"/>
+                      <a:r>
+                        <a:rPr lang="en-CA" sz="2500" b="1" dirty="0">
+                          <a:solidFill>
+                            <a:schemeClr val="tx1"/>
+                          </a:solidFill>
+                        </a:rPr>
+                        <a:t>(0, 1)</a:t>
+                      </a:r>
+                    </a:p>
+                  </a:txBody>
+                  <a:tcPr marL="125476" marR="125476" marT="62738" marB="62738" anchor="ctr">
+                    <a:lnT w="28575" cap="flat" cmpd="sng" algn="ctr">
+                      <a:solidFill>
+                        <a:schemeClr val="tx1"/>
+                      </a:solidFill>
+                      <a:prstDash val="solid"/>
+                      <a:round/>
+                      <a:headEnd type="none" w="med" len="med"/>
+                      <a:tailEnd type="none" w="med" len="med"/>
+                    </a:lnT>
+                    <a:solidFill>
+                      <a:schemeClr val="tx1">
+                        <a:alpha val="19778"/>
+                      </a:schemeClr>
+                    </a:solidFill>
+                  </a:tcPr>
+                </a:tc>
+                <a:tc>
+                  <a:txBody>
+                    <a:bodyPr/>
+                    <a:lstStyle/>
+                    <a:p>
+                      <a:pPr algn="ctr"/>
+                      <a:r>
+                        <a:rPr lang="en-CA" sz="2500" b="1" dirty="0">
+                          <a:solidFill>
+                            <a:schemeClr val="tx1"/>
+                          </a:solidFill>
+                        </a:rPr>
+                        <a:t>(0, 2)</a:t>
+                      </a:r>
+                    </a:p>
+                  </a:txBody>
+                  <a:tcPr marL="125476" marR="125476" marT="62738" marB="62738" anchor="ctr">
+                    <a:lnT w="28575" cap="flat" cmpd="sng" algn="ctr">
+                      <a:solidFill>
+                        <a:schemeClr val="tx1"/>
+                      </a:solidFill>
+                      <a:prstDash val="solid"/>
+                      <a:round/>
+                      <a:headEnd type="none" w="med" len="med"/>
+                      <a:tailEnd type="none" w="med" len="med"/>
+                    </a:lnT>
+                    <a:solidFill>
+                      <a:schemeClr val="tx1">
+                        <a:alpha val="19778"/>
+                      </a:schemeClr>
+                    </a:solidFill>
+                  </a:tcPr>
+                </a:tc>
+                <a:tc>
+                  <a:txBody>
+                    <a:bodyPr/>
+                    <a:lstStyle/>
+                    <a:p>
+                      <a:pPr algn="ctr"/>
+                      <a:r>
+                        <a:rPr lang="en-CA" sz="2500" b="1" dirty="0">
+                          <a:solidFill>
+                            <a:schemeClr val="tx1"/>
+                          </a:solidFill>
+                        </a:rPr>
+                        <a:t>(0, 3)</a:t>
+                      </a:r>
+                    </a:p>
+                  </a:txBody>
+                  <a:tcPr marL="125476" marR="125476" marT="62738" marB="62738" anchor="ctr">
+                    <a:lnT w="28575" cap="flat" cmpd="sng" algn="ctr">
+                      <a:solidFill>
+                        <a:schemeClr val="tx1"/>
+                      </a:solidFill>
+                      <a:prstDash val="solid"/>
+                      <a:round/>
+                      <a:headEnd type="none" w="med" len="med"/>
+                      <a:tailEnd type="none" w="med" len="med"/>
+                    </a:lnT>
+                    <a:solidFill>
+                      <a:schemeClr val="tx1">
+                        <a:alpha val="19778"/>
+                      </a:schemeClr>
+                    </a:solidFill>
+                  </a:tcPr>
+                </a:tc>
+                <a:tc>
+                  <a:txBody>
+                    <a:bodyPr/>
+                    <a:lstStyle/>
+                    <a:p>
+                      <a:pPr algn="ctr"/>
+                      <a:r>
+                        <a:rPr lang="en-CA" sz="2500" b="1" dirty="0">
+                          <a:solidFill>
+                            <a:schemeClr val="tx1"/>
+                          </a:solidFill>
+                        </a:rPr>
+                        <a:t>(0, 4)</a:t>
+                      </a:r>
+                    </a:p>
+                  </a:txBody>
+                  <a:tcPr marL="125476" marR="125476" marT="62738" marB="62738" anchor="ctr">
+                    <a:lnT w="28575" cap="flat" cmpd="sng" algn="ctr">
+                      <a:solidFill>
+                        <a:schemeClr val="tx1"/>
+                      </a:solidFill>
+                      <a:prstDash val="solid"/>
+                      <a:round/>
+                      <a:headEnd type="none" w="med" len="med"/>
+                      <a:tailEnd type="none" w="med" len="med"/>
+                    </a:lnT>
+                    <a:solidFill>
+                      <a:schemeClr val="tx1">
+                        <a:alpha val="19778"/>
+                      </a:schemeClr>
+                    </a:solidFill>
+                  </a:tcPr>
+                </a:tc>
+                <a:tc>
+                  <a:txBody>
+                    <a:bodyPr/>
+                    <a:lstStyle/>
+                    <a:p>
+                      <a:pPr algn="ctr"/>
+                      <a:r>
+                        <a:rPr lang="en-CA" sz="2500" b="1" dirty="0">
+                          <a:solidFill>
+                            <a:schemeClr val="tx1"/>
+                          </a:solidFill>
+                        </a:rPr>
+                        <a:t>(0, 5)</a:t>
+                      </a:r>
+                    </a:p>
+                  </a:txBody>
+                  <a:tcPr marL="125476" marR="125476" marT="62738" marB="62738" anchor="ctr">
+                    <a:lnR w="28575" cap="flat" cmpd="sng" algn="ctr">
+                      <a:solidFill>
+                        <a:schemeClr val="tx1"/>
+                      </a:solidFill>
+                      <a:prstDash val="solid"/>
+                      <a:round/>
+                      <a:headEnd type="none" w="med" len="med"/>
+                      <a:tailEnd type="none" w="med" len="med"/>
+                    </a:lnR>
+                    <a:lnT w="28575" cap="flat" cmpd="sng" algn="ctr">
+                      <a:solidFill>
+                        <a:schemeClr val="tx1"/>
+                      </a:solidFill>
+                      <a:prstDash val="solid"/>
+                      <a:round/>
+                      <a:headEnd type="none" w="med" len="med"/>
+                      <a:tailEnd type="none" w="med" len="med"/>
+                    </a:lnT>
+                    <a:solidFill>
+                      <a:schemeClr val="tx1">
+                        <a:alpha val="19778"/>
+                      </a:schemeClr>
+                    </a:solidFill>
+                  </a:tcPr>
+                </a:tc>
+                <a:extLst>
+                  <a:ext uri="{0D108BD9-81ED-4DB2-BD59-A6C34878D82A}">
+                    <a16:rowId xmlns:a16="http://schemas.microsoft.com/office/drawing/2014/main" val="4174509116"/>
+                  </a:ext>
+                </a:extLst>
+              </a:tr>
+              <a:tr h="1057875">
+                <a:tc>
+                  <a:txBody>
+                    <a:bodyPr/>
+                    <a:lstStyle/>
+                    <a:p>
+                      <a:pPr algn="ctr"/>
+                      <a:r>
+                        <a:rPr lang="en-CA" sz="2500" b="1" dirty="0"/>
+                        <a:t>(1, 0)</a:t>
+                      </a:r>
+                    </a:p>
+                  </a:txBody>
+                  <a:tcPr marL="125476" marR="125476" marT="62738" marB="62738" anchor="ctr">
+                    <a:lnL w="28575" cap="flat" cmpd="sng" algn="ctr">
+                      <a:solidFill>
+                        <a:schemeClr val="tx1"/>
+                      </a:solidFill>
+                      <a:prstDash val="solid"/>
+                      <a:round/>
+                      <a:headEnd type="none" w="med" len="med"/>
+                      <a:tailEnd type="none" w="med" len="med"/>
+                    </a:lnL>
+                  </a:tcPr>
+                </a:tc>
+                <a:tc>
+                  <a:txBody>
+                    <a:bodyPr/>
+                    <a:lstStyle/>
+                    <a:p>
+                      <a:pPr algn="ctr"/>
+                      <a:r>
+                        <a:rPr lang="en-CA" sz="2500" b="1" dirty="0"/>
+                        <a:t>(1, 1)</a:t>
+                      </a:r>
+                    </a:p>
+                  </a:txBody>
+                  <a:tcPr marL="125476" marR="125476" marT="62738" marB="62738" anchor="ctr"/>
+                </a:tc>
+                <a:tc>
+                  <a:txBody>
+                    <a:bodyPr/>
+                    <a:lstStyle/>
+                    <a:p>
+                      <a:pPr algn="ctr"/>
+                      <a:r>
+                        <a:rPr lang="en-CA" sz="2500" b="1" dirty="0"/>
+                        <a:t>(1, 2)</a:t>
+                      </a:r>
+                    </a:p>
+                  </a:txBody>
+                  <a:tcPr marL="125476" marR="125476" marT="62738" marB="62738" anchor="ctr"/>
+                </a:tc>
+                <a:tc>
+                  <a:txBody>
+                    <a:bodyPr/>
+                    <a:lstStyle/>
+                    <a:p>
+                      <a:pPr algn="ctr"/>
+                      <a:r>
+                        <a:rPr lang="en-CA" sz="2500" b="1" dirty="0"/>
+                        <a:t>(1, 3)</a:t>
+                      </a:r>
+                    </a:p>
+                  </a:txBody>
+                  <a:tcPr marL="125476" marR="125476" marT="62738" marB="62738" anchor="ctr"/>
+                </a:tc>
+                <a:tc>
+                  <a:txBody>
+                    <a:bodyPr/>
+                    <a:lstStyle/>
+                    <a:p>
+                      <a:pPr algn="ctr"/>
+                      <a:r>
+                        <a:rPr lang="en-CA" sz="2500" b="1" dirty="0"/>
+                        <a:t>(1, 4)</a:t>
+                      </a:r>
+                    </a:p>
+                  </a:txBody>
+                  <a:tcPr marL="125476" marR="125476" marT="62738" marB="62738" anchor="ctr"/>
+                </a:tc>
+                <a:tc>
+                  <a:txBody>
+                    <a:bodyPr/>
+                    <a:lstStyle/>
+                    <a:p>
+                      <a:pPr algn="ctr"/>
+                      <a:r>
+                        <a:rPr lang="en-CA" sz="2500" b="1" dirty="0"/>
+                        <a:t>(1, 5)</a:t>
+                      </a:r>
+                    </a:p>
+                  </a:txBody>
+                  <a:tcPr marL="125476" marR="125476" marT="62738" marB="62738" anchor="ctr">
+                    <a:lnR w="28575" cap="flat" cmpd="sng" algn="ctr">
+                      <a:solidFill>
+                        <a:schemeClr val="tx1"/>
+                      </a:solidFill>
+                      <a:prstDash val="solid"/>
+                      <a:round/>
+                      <a:headEnd type="none" w="med" len="med"/>
+                      <a:tailEnd type="none" w="med" len="med"/>
+                    </a:lnR>
+                  </a:tcPr>
+                </a:tc>
+                <a:extLst>
+                  <a:ext uri="{0D108BD9-81ED-4DB2-BD59-A6C34878D82A}">
+                    <a16:rowId xmlns:a16="http://schemas.microsoft.com/office/drawing/2014/main" val="869178520"/>
+                  </a:ext>
+                </a:extLst>
+              </a:tr>
+              <a:tr h="1057875">
+                <a:tc>
+                  <a:txBody>
+                    <a:bodyPr/>
+                    <a:lstStyle/>
+                    <a:p>
+                      <a:pPr algn="ctr"/>
+                      <a:r>
+                        <a:rPr lang="en-CA" sz="2500" b="1" dirty="0"/>
+                        <a:t>(2, 0)</a:t>
+                      </a:r>
+                    </a:p>
+                  </a:txBody>
+                  <a:tcPr marL="125476" marR="125476" marT="62738" marB="62738" anchor="ctr">
+                    <a:lnL w="28575" cap="flat" cmpd="sng" algn="ctr">
+                      <a:solidFill>
+                        <a:schemeClr val="tx1"/>
+                      </a:solidFill>
+                      <a:prstDash val="solid"/>
+                      <a:round/>
+                      <a:headEnd type="none" w="med" len="med"/>
+                      <a:tailEnd type="none" w="med" len="med"/>
+                    </a:lnL>
+                  </a:tcPr>
+                </a:tc>
+                <a:tc>
+                  <a:txBody>
+                    <a:bodyPr/>
+                    <a:lstStyle/>
+                    <a:p>
+                      <a:pPr algn="ctr"/>
+                      <a:r>
+                        <a:rPr lang="en-CA" sz="2500" b="1" dirty="0"/>
+                        <a:t>(2, 1)</a:t>
+                      </a:r>
+                    </a:p>
+                  </a:txBody>
+                  <a:tcPr marL="125476" marR="125476" marT="62738" marB="62738" anchor="ctr"/>
+                </a:tc>
+                <a:tc>
+                  <a:txBody>
+                    <a:bodyPr/>
+                    <a:lstStyle/>
+                    <a:p>
+                      <a:pPr algn="ctr"/>
+                      <a:r>
+                        <a:rPr lang="en-CA" sz="2500" b="1" dirty="0"/>
+                        <a:t>(2, 2)</a:t>
+                      </a:r>
+                    </a:p>
+                  </a:txBody>
+                  <a:tcPr marL="125476" marR="125476" marT="62738" marB="62738" anchor="ctr"/>
+                </a:tc>
+                <a:tc>
+                  <a:txBody>
+                    <a:bodyPr/>
+                    <a:lstStyle/>
+                    <a:p>
+                      <a:pPr algn="ctr"/>
+                      <a:r>
+                        <a:rPr lang="en-CA" sz="2500" b="1" dirty="0"/>
+                        <a:t>(2, 3)</a:t>
+                      </a:r>
+                    </a:p>
+                  </a:txBody>
+                  <a:tcPr marL="125476" marR="125476" marT="62738" marB="62738" anchor="ctr"/>
+                </a:tc>
+                <a:tc>
+                  <a:txBody>
+                    <a:bodyPr/>
+                    <a:lstStyle/>
+                    <a:p>
+                      <a:pPr algn="ctr"/>
+                      <a:r>
+                        <a:rPr lang="en-CA" sz="2500" b="1" dirty="0"/>
+                        <a:t>(2, 4)</a:t>
+                      </a:r>
+                    </a:p>
+                  </a:txBody>
+                  <a:tcPr marL="125476" marR="125476" marT="62738" marB="62738" anchor="ctr"/>
+                </a:tc>
+                <a:tc>
+                  <a:txBody>
+                    <a:bodyPr/>
+                    <a:lstStyle/>
+                    <a:p>
+                      <a:pPr algn="ctr"/>
+                      <a:r>
+                        <a:rPr lang="en-CA" sz="2500" b="1" dirty="0"/>
+                        <a:t>(2, 5)</a:t>
+                      </a:r>
+                    </a:p>
+                  </a:txBody>
+                  <a:tcPr marL="125476" marR="125476" marT="62738" marB="62738" anchor="ctr">
+                    <a:lnR w="28575" cap="flat" cmpd="sng" algn="ctr">
+                      <a:solidFill>
+                        <a:schemeClr val="tx1"/>
+                      </a:solidFill>
+                      <a:prstDash val="solid"/>
+                      <a:round/>
+                      <a:headEnd type="none" w="med" len="med"/>
+                      <a:tailEnd type="none" w="med" len="med"/>
+                    </a:lnR>
+                  </a:tcPr>
+                </a:tc>
+                <a:extLst>
+                  <a:ext uri="{0D108BD9-81ED-4DB2-BD59-A6C34878D82A}">
+                    <a16:rowId xmlns:a16="http://schemas.microsoft.com/office/drawing/2014/main" val="1972965025"/>
+                  </a:ext>
+                </a:extLst>
+              </a:tr>
+              <a:tr h="1057875">
+                <a:tc>
+                  <a:txBody>
+                    <a:bodyPr/>
+                    <a:lstStyle/>
+                    <a:p>
+                      <a:pPr algn="ctr"/>
+                      <a:r>
+                        <a:rPr lang="en-CA" sz="2500" b="1" dirty="0"/>
+                        <a:t>(3, 0)</a:t>
+                      </a:r>
+                    </a:p>
+                  </a:txBody>
+                  <a:tcPr marL="125476" marR="125476" marT="62738" marB="62738" anchor="ctr">
+                    <a:lnL w="28575" cap="flat" cmpd="sng" algn="ctr">
+                      <a:solidFill>
+                        <a:schemeClr val="tx1"/>
+                      </a:solidFill>
+                      <a:prstDash val="solid"/>
+                      <a:round/>
+                      <a:headEnd type="none" w="med" len="med"/>
+                      <a:tailEnd type="none" w="med" len="med"/>
+                    </a:lnL>
+                  </a:tcPr>
+                </a:tc>
+                <a:tc>
+                  <a:txBody>
+                    <a:bodyPr/>
+                    <a:lstStyle/>
+                    <a:p>
+                      <a:pPr algn="ctr"/>
+                      <a:r>
+                        <a:rPr lang="en-CA" sz="2500" b="1" dirty="0"/>
+                        <a:t>(3, 1)</a:t>
+                      </a:r>
+                    </a:p>
+                  </a:txBody>
+                  <a:tcPr marL="125476" marR="125476" marT="62738" marB="62738" anchor="ctr"/>
+                </a:tc>
+                <a:tc>
+                  <a:txBody>
+                    <a:bodyPr/>
+                    <a:lstStyle/>
+                    <a:p>
+                      <a:pPr algn="ctr"/>
+                      <a:r>
+                        <a:rPr lang="en-CA" sz="2500" b="1" dirty="0"/>
+                        <a:t>(3, 2)</a:t>
+                      </a:r>
+                    </a:p>
+                  </a:txBody>
+                  <a:tcPr marL="125476" marR="125476" marT="62738" marB="62738" anchor="ctr"/>
+                </a:tc>
+                <a:tc>
+                  <a:txBody>
+                    <a:bodyPr/>
+                    <a:lstStyle/>
+                    <a:p>
+                      <a:pPr algn="ctr"/>
+                      <a:r>
+                        <a:rPr lang="en-CA" sz="2500" b="1" dirty="0"/>
+                        <a:t>(3, 3)</a:t>
+                      </a:r>
+                    </a:p>
+                  </a:txBody>
+                  <a:tcPr marL="125476" marR="125476" marT="62738" marB="62738" anchor="ctr"/>
+                </a:tc>
+                <a:tc>
+                  <a:txBody>
+                    <a:bodyPr/>
+                    <a:lstStyle/>
+                    <a:p>
+                      <a:pPr algn="ctr"/>
+                      <a:r>
+                        <a:rPr lang="en-CA" sz="2500" b="1" dirty="0"/>
+                        <a:t>(3, 4)</a:t>
+                      </a:r>
+                    </a:p>
+                  </a:txBody>
+                  <a:tcPr marL="125476" marR="125476" marT="62738" marB="62738" anchor="ctr"/>
+                </a:tc>
+                <a:tc>
+                  <a:txBody>
+                    <a:bodyPr/>
+                    <a:lstStyle/>
+                    <a:p>
+                      <a:pPr algn="ctr"/>
+                      <a:r>
+                        <a:rPr lang="en-CA" sz="2500" b="1" dirty="0"/>
+                        <a:t>(3, 5)</a:t>
+                      </a:r>
+                    </a:p>
+                  </a:txBody>
+                  <a:tcPr marL="125476" marR="125476" marT="62738" marB="62738" anchor="ctr">
+                    <a:lnR w="28575" cap="flat" cmpd="sng" algn="ctr">
+                      <a:solidFill>
+                        <a:schemeClr val="tx1"/>
+                      </a:solidFill>
+                      <a:prstDash val="solid"/>
+                      <a:round/>
+                      <a:headEnd type="none" w="med" len="med"/>
+                      <a:tailEnd type="none" w="med" len="med"/>
+                    </a:lnR>
+                  </a:tcPr>
+                </a:tc>
+                <a:extLst>
+                  <a:ext uri="{0D108BD9-81ED-4DB2-BD59-A6C34878D82A}">
+                    <a16:rowId xmlns:a16="http://schemas.microsoft.com/office/drawing/2014/main" val="578959827"/>
+                  </a:ext>
+                </a:extLst>
+              </a:tr>
+              <a:tr h="1057875">
+                <a:tc>
+                  <a:txBody>
+                    <a:bodyPr/>
+                    <a:lstStyle/>
+                    <a:p>
+                      <a:pPr algn="ctr"/>
+                      <a:r>
+                        <a:rPr lang="en-CA" sz="2500" b="1" dirty="0"/>
+                        <a:t>(4, 0)</a:t>
+                      </a:r>
+                    </a:p>
+                  </a:txBody>
+                  <a:tcPr marL="125476" marR="125476" marT="62738" marB="62738" anchor="ctr">
+                    <a:lnL w="28575" cap="flat" cmpd="sng" algn="ctr">
+                      <a:solidFill>
+                        <a:schemeClr val="tx1"/>
+                      </a:solidFill>
+                      <a:prstDash val="solid"/>
+                      <a:round/>
+                      <a:headEnd type="none" w="med" len="med"/>
+                      <a:tailEnd type="none" w="med" len="med"/>
+                    </a:lnL>
+                    <a:lnB w="28575" cap="flat" cmpd="sng" algn="ctr">
+                      <a:solidFill>
+                        <a:schemeClr val="tx1"/>
+                      </a:solidFill>
+                      <a:prstDash val="solid"/>
+                      <a:round/>
+                      <a:headEnd type="none" w="med" len="med"/>
+                      <a:tailEnd type="none" w="med" len="med"/>
+                    </a:lnB>
+                  </a:tcPr>
+                </a:tc>
+                <a:tc>
+                  <a:txBody>
+                    <a:bodyPr/>
+                    <a:lstStyle/>
+                    <a:p>
+                      <a:pPr algn="ctr"/>
+                      <a:r>
+                        <a:rPr lang="en-CA" sz="2500" b="1" dirty="0"/>
+                        <a:t>(4, 1)</a:t>
+                      </a:r>
+                    </a:p>
+                  </a:txBody>
+                  <a:tcPr marL="125476" marR="125476" marT="62738" marB="62738" anchor="ctr">
+                    <a:lnB w="28575" cap="flat" cmpd="sng" algn="ctr">
+                      <a:solidFill>
+                        <a:schemeClr val="tx1"/>
+                      </a:solidFill>
+                      <a:prstDash val="solid"/>
+                      <a:round/>
+                      <a:headEnd type="none" w="med" len="med"/>
+                      <a:tailEnd type="none" w="med" len="med"/>
+                    </a:lnB>
+                  </a:tcPr>
+                </a:tc>
+                <a:tc>
+                  <a:txBody>
+                    <a:bodyPr/>
+                    <a:lstStyle/>
+                    <a:p>
+                      <a:pPr algn="ctr"/>
+                      <a:r>
+                        <a:rPr lang="en-CA" sz="2500" b="1" dirty="0"/>
+                        <a:t>(4, 2)</a:t>
+                      </a:r>
+                    </a:p>
+                  </a:txBody>
+                  <a:tcPr marL="125476" marR="125476" marT="62738" marB="62738" anchor="ctr">
+                    <a:lnB w="28575" cap="flat" cmpd="sng" algn="ctr">
+                      <a:solidFill>
+                        <a:schemeClr val="tx1"/>
+                      </a:solidFill>
+                      <a:prstDash val="solid"/>
+                      <a:round/>
+                      <a:headEnd type="none" w="med" len="med"/>
+                      <a:tailEnd type="none" w="med" len="med"/>
+                    </a:lnB>
+                  </a:tcPr>
+                </a:tc>
+                <a:tc>
+                  <a:txBody>
+                    <a:bodyPr/>
+                    <a:lstStyle/>
+                    <a:p>
+                      <a:pPr algn="ctr"/>
+                      <a:r>
+                        <a:rPr lang="en-CA" sz="2500" b="1" dirty="0"/>
+                        <a:t>(4, 3)</a:t>
+                      </a:r>
+                    </a:p>
+                  </a:txBody>
+                  <a:tcPr marL="125476" marR="125476" marT="62738" marB="62738" anchor="ctr">
+                    <a:lnB w="28575" cap="flat" cmpd="sng" algn="ctr">
+                      <a:solidFill>
+                        <a:schemeClr val="tx1"/>
+                      </a:solidFill>
+                      <a:prstDash val="solid"/>
+                      <a:round/>
+                      <a:headEnd type="none" w="med" len="med"/>
+                      <a:tailEnd type="none" w="med" len="med"/>
+                    </a:lnB>
+                  </a:tcPr>
+                </a:tc>
+                <a:tc>
+                  <a:txBody>
+                    <a:bodyPr/>
+                    <a:lstStyle/>
+                    <a:p>
+                      <a:pPr algn="ctr"/>
+                      <a:r>
+                        <a:rPr lang="en-CA" sz="2500" b="1" dirty="0"/>
+                        <a:t>(4, 4)</a:t>
+                      </a:r>
+                    </a:p>
+                  </a:txBody>
+                  <a:tcPr marL="125476" marR="125476" marT="62738" marB="62738" anchor="ctr">
+                    <a:lnB w="28575" cap="flat" cmpd="sng" algn="ctr">
+                      <a:solidFill>
+                        <a:schemeClr val="tx1"/>
+                      </a:solidFill>
+                      <a:prstDash val="solid"/>
+                      <a:round/>
+                      <a:headEnd type="none" w="med" len="med"/>
+                      <a:tailEnd type="none" w="med" len="med"/>
+                    </a:lnB>
+                  </a:tcPr>
+                </a:tc>
+                <a:tc>
+                  <a:txBody>
+                    <a:bodyPr/>
+                    <a:lstStyle/>
+                    <a:p>
+                      <a:pPr algn="ctr"/>
+                      <a:r>
+                        <a:rPr lang="en-CA" sz="2500" b="1" dirty="0"/>
+                        <a:t>(4, 5)</a:t>
+                      </a:r>
+                    </a:p>
+                  </a:txBody>
+                  <a:tcPr marL="125476" marR="125476" marT="62738" marB="62738" anchor="ctr">
+                    <a:lnR w="28575" cap="flat" cmpd="sng" algn="ctr">
+                      <a:solidFill>
+                        <a:schemeClr val="tx1"/>
+                      </a:solidFill>
+                      <a:prstDash val="solid"/>
+                      <a:round/>
+                      <a:headEnd type="none" w="med" len="med"/>
+                      <a:tailEnd type="none" w="med" len="med"/>
+                    </a:lnR>
+                    <a:lnB w="28575" cap="flat" cmpd="sng" algn="ctr">
+                      <a:solidFill>
+                        <a:schemeClr val="tx1"/>
+                      </a:solidFill>
+                      <a:prstDash val="solid"/>
+                      <a:round/>
+                      <a:headEnd type="none" w="med" len="med"/>
+                      <a:tailEnd type="none" w="med" len="med"/>
+                    </a:lnB>
+                  </a:tcPr>
+                </a:tc>
+                <a:extLst>
+                  <a:ext uri="{0D108BD9-81ED-4DB2-BD59-A6C34878D82A}">
+                    <a16:rowId xmlns:a16="http://schemas.microsoft.com/office/drawing/2014/main" val="85115382"/>
+                  </a:ext>
+                </a:extLst>
+              </a:tr>
+            </a:tbl>
+          </a:graphicData>
+        </a:graphic>
+      </p:graphicFrame>
+      <p:sp>
+        <p:nvSpPr>
+          <p:cNvPr id="4" name="TextBox 3">
+            <a:extLst>
+              <a:ext uri="{FF2B5EF4-FFF2-40B4-BE49-F238E27FC236}">
+                <a16:creationId xmlns:a16="http://schemas.microsoft.com/office/drawing/2014/main" id="{388492A2-1F09-4B96-CC84-50CF5D7AD05E}"/>
+              </a:ext>
+            </a:extLst>
+          </p:cNvPr>
+          <p:cNvSpPr txBox="1"/>
+          <p:nvPr/>
+        </p:nvSpPr>
+        <p:spPr>
+          <a:xfrm>
+            <a:off x="3419280" y="6067168"/>
+            <a:ext cx="2305439" cy="584775"/>
+          </a:xfrm>
+          <a:prstGeom prst="rect">
+            <a:avLst/>
+          </a:prstGeom>
+          <a:noFill/>
+        </p:spPr>
+        <p:txBody>
+          <a:bodyPr wrap="none" rtlCol="0">
+            <a:spAutoFit/>
+          </a:bodyPr>
+          <a:lstStyle/>
+          <a:p>
+            <a:r>
+              <a:rPr lang="en-CA" sz="3200" b="1" dirty="0"/>
+              <a:t>Shape: (5, 6)</a:t>
+            </a:r>
+          </a:p>
+        </p:txBody>
+      </p:sp>
+      <p:sp>
+        <p:nvSpPr>
+          <p:cNvPr id="5" name="TextBox 4">
+            <a:extLst>
+              <a:ext uri="{FF2B5EF4-FFF2-40B4-BE49-F238E27FC236}">
+                <a16:creationId xmlns:a16="http://schemas.microsoft.com/office/drawing/2014/main" id="{D5252BC9-85EA-823B-57EC-C6FB43215009}"/>
+              </a:ext>
+            </a:extLst>
+          </p:cNvPr>
+          <p:cNvSpPr txBox="1"/>
+          <p:nvPr/>
+        </p:nvSpPr>
+        <p:spPr>
+          <a:xfrm>
+            <a:off x="494270" y="58231"/>
+            <a:ext cx="2762295" cy="523220"/>
+          </a:xfrm>
+          <a:prstGeom prst="rect">
+            <a:avLst/>
+          </a:prstGeom>
+          <a:noFill/>
+        </p:spPr>
+        <p:txBody>
+          <a:bodyPr wrap="none" rtlCol="0">
+            <a:spAutoFit/>
+          </a:bodyPr>
+          <a:lstStyle/>
+          <a:p>
+            <a:r>
+              <a:rPr lang="en-CA" sz="2800" b="1" dirty="0" err="1">
+                <a:latin typeface="Roboto Mono" pitchFamily="2" charset="0"/>
+                <a:ea typeface="Roboto Mono" pitchFamily="2" charset="0"/>
+              </a:rPr>
+              <a:t>my_array</a:t>
+            </a:r>
+            <a:r>
+              <a:rPr lang="en-CA" sz="2800" b="1" dirty="0">
+                <a:latin typeface="Roboto Mono" pitchFamily="2" charset="0"/>
+                <a:ea typeface="Roboto Mono" pitchFamily="2" charset="0"/>
+              </a:rPr>
+              <a:t>[0]?</a:t>
+            </a:r>
+          </a:p>
+        </p:txBody>
+      </p:sp>
+    </p:spTree>
+    <p:extLst>
+      <p:ext uri="{BB962C8B-B14F-4D97-AF65-F5344CB8AC3E}">
+        <p14:creationId xmlns:p14="http://schemas.microsoft.com/office/powerpoint/2010/main" val="842828176"/>
+      </p:ext>
+    </p:extLst>
+  </p:cSld>
+  <p:clrMapOvr>
+    <a:masterClrMapping/>
+  </p:clrMapOvr>
+  <mc:AlternateContent xmlns:mc="http://schemas.openxmlformats.org/markup-compatibility/2006" xmlns:p159="http://schemas.microsoft.com/office/powerpoint/2015/09/main">
+    <mc:Choice Requires="p159">
+      <p:transition xmlns:p14="http://schemas.microsoft.com/office/powerpoint/2010/main" spd="slow" p14:dur="2000">
+        <p159:morph option="byChar"/>
+      </p:transition>
+    </mc:Choice>
+    <mc:Fallback xmlns="">
+      <p:transition spd="slow">
+        <p:fade/>
+      </p:transition>
+    </mc:Fallback>
+  </mc:AlternateContent>
+</p:sld>
+</file>
+
+<file path=ppt/slides/slide11.xml><?xml version="1.0" encoding="utf-8"?>
+<p:sld xmlns:a="http://schemas.openxmlformats.org/drawingml/2006/main" xmlns:r="http://schemas.openxmlformats.org/officeDocument/2006/relationships" xmlns:p="http://schemas.openxmlformats.org/presentationml/2006/main">
+  <p:cSld>
+    <p:spTree>
+      <p:nvGrpSpPr>
+        <p:cNvPr id="1" name=""/>
+        <p:cNvGrpSpPr/>
+        <p:nvPr/>
+      </p:nvGrpSpPr>
+      <p:grpSpPr>
+        <a:xfrm>
+          <a:off x="0" y="0"/>
+          <a:ext cx="0" cy="0"/>
+          <a:chOff x="0" y="0"/>
+          <a:chExt cx="0" cy="0"/>
+        </a:xfrm>
+      </p:grpSpPr>
+      <p:graphicFrame>
+        <p:nvGraphicFramePr>
+          <p:cNvPr id="3" name="Table 2">
+            <a:extLst>
+              <a:ext uri="{FF2B5EF4-FFF2-40B4-BE49-F238E27FC236}">
+                <a16:creationId xmlns:a16="http://schemas.microsoft.com/office/drawing/2014/main" id="{FC9A80B6-5D2E-8104-3EFE-2662610E7846}"/>
+              </a:ext>
+            </a:extLst>
+          </p:cNvPr>
+          <p:cNvGraphicFramePr>
+            <a:graphicFrameLocks noGrp="1"/>
+          </p:cNvGraphicFramePr>
+          <p:nvPr/>
+        </p:nvGraphicFramePr>
+        <p:xfrm>
+          <a:off x="389482" y="679622"/>
+          <a:ext cx="8365038" cy="5289375"/>
+        </p:xfrm>
+        <a:graphic>
+          <a:graphicData uri="http://schemas.openxmlformats.org/drawingml/2006/table">
+            <a:tbl>
+              <a:tblPr bandRow="1">
+                <a:tableStyleId>{9D7B26C5-4107-4FEC-AEDC-1716B250A1EF}</a:tableStyleId>
+              </a:tblPr>
+              <a:tblGrid>
+                <a:gridCol w="1394173">
+                  <a:extLst>
+                    <a:ext uri="{9D8B030D-6E8A-4147-A177-3AD203B41FA5}">
+                      <a16:colId xmlns:a16="http://schemas.microsoft.com/office/drawing/2014/main" val="501879301"/>
+                    </a:ext>
+                  </a:extLst>
+                </a:gridCol>
+                <a:gridCol w="1394173">
+                  <a:extLst>
+                    <a:ext uri="{9D8B030D-6E8A-4147-A177-3AD203B41FA5}">
+                      <a16:colId xmlns:a16="http://schemas.microsoft.com/office/drawing/2014/main" val="1303827765"/>
+                    </a:ext>
+                  </a:extLst>
+                </a:gridCol>
+                <a:gridCol w="1394173">
+                  <a:extLst>
+                    <a:ext uri="{9D8B030D-6E8A-4147-A177-3AD203B41FA5}">
+                      <a16:colId xmlns:a16="http://schemas.microsoft.com/office/drawing/2014/main" val="2642395476"/>
+                    </a:ext>
+                  </a:extLst>
+                </a:gridCol>
+                <a:gridCol w="1394173">
+                  <a:extLst>
+                    <a:ext uri="{9D8B030D-6E8A-4147-A177-3AD203B41FA5}">
+                      <a16:colId xmlns:a16="http://schemas.microsoft.com/office/drawing/2014/main" val="31023376"/>
+                    </a:ext>
+                  </a:extLst>
+                </a:gridCol>
+                <a:gridCol w="1394173">
+                  <a:extLst>
+                    <a:ext uri="{9D8B030D-6E8A-4147-A177-3AD203B41FA5}">
+                      <a16:colId xmlns:a16="http://schemas.microsoft.com/office/drawing/2014/main" val="1036227730"/>
+                    </a:ext>
+                  </a:extLst>
+                </a:gridCol>
+                <a:gridCol w="1394173">
+                  <a:extLst>
+                    <a:ext uri="{9D8B030D-6E8A-4147-A177-3AD203B41FA5}">
+                      <a16:colId xmlns:a16="http://schemas.microsoft.com/office/drawing/2014/main" val="1909034482"/>
+                    </a:ext>
+                  </a:extLst>
+                </a:gridCol>
+              </a:tblGrid>
+              <a:tr h="1057875">
+                <a:tc>
+                  <a:txBody>
+                    <a:bodyPr/>
+                    <a:lstStyle/>
+                    <a:p>
+                      <a:pPr algn="ctr"/>
+                      <a:r>
+                        <a:rPr lang="en-CA" sz="2500" b="1" dirty="0">
+                          <a:solidFill>
                             <a:schemeClr val="bg1"/>
                           </a:solidFill>
                         </a:rPr>
@@ -3927,7 +4847,7 @@
 </p:sld>
 </file>
 
-<file path=ppt/slides/slide11.xml><?xml version="1.0" encoding="utf-8"?>
+<file path=ppt/slides/slide12.xml><?xml version="1.0" encoding="utf-8"?>
 <p:sld xmlns:a="http://schemas.openxmlformats.org/drawingml/2006/main" xmlns:r="http://schemas.openxmlformats.org/officeDocument/2006/relationships" xmlns:p="http://schemas.openxmlformats.org/presentationml/2006/main">
   <p:cSld>
     <p:spTree>
@@ -4834,7 +5754,7 @@
 </p:sld>
 </file>
 
-<file path=ppt/slides/slide12.xml><?xml version="1.0" encoding="utf-8"?>
+<file path=ppt/slides/slide13.xml><?xml version="1.0" encoding="utf-8"?>
 <p:sld xmlns:a="http://schemas.openxmlformats.org/drawingml/2006/main" xmlns:r="http://schemas.openxmlformats.org/officeDocument/2006/relationships" xmlns:p="http://schemas.openxmlformats.org/presentationml/2006/main">
   <p:cSld>
     <p:spTree>
@@ -5779,7 +6699,7 @@
 </p:sld>
 </file>
 
-<file path=ppt/slides/slide13.xml><?xml version="1.0" encoding="utf-8"?>
+<file path=ppt/slides/slide14.xml><?xml version="1.0" encoding="utf-8"?>
 <p:sld xmlns:a="http://schemas.openxmlformats.org/drawingml/2006/main" xmlns:r="http://schemas.openxmlformats.org/officeDocument/2006/relationships" xmlns:p="http://schemas.openxmlformats.org/presentationml/2006/main">
   <p:cSld>
     <p:spTree>
@@ -6724,7 +7644,7 @@
 </p:sld>
 </file>
 
-<file path=ppt/slides/slide14.xml><?xml version="1.0" encoding="utf-8"?>
+<file path=ppt/slides/slide15.xml><?xml version="1.0" encoding="utf-8"?>
 <p:sld xmlns:a="http://schemas.openxmlformats.org/drawingml/2006/main" xmlns:r="http://schemas.openxmlformats.org/officeDocument/2006/relationships" xmlns:p="http://schemas.openxmlformats.org/presentationml/2006/main">
   <p:cSld>
     <p:spTree>
@@ -7711,7 +8631,7 @@
 </p:sld>
 </file>
 
-<file path=ppt/slides/slide15.xml><?xml version="1.0" encoding="utf-8"?>
+<file path=ppt/slides/slide16.xml><?xml version="1.0" encoding="utf-8"?>
 <p:sld xmlns:a="http://schemas.openxmlformats.org/drawingml/2006/main" xmlns:r="http://schemas.openxmlformats.org/officeDocument/2006/relationships" xmlns:p="http://schemas.openxmlformats.org/presentationml/2006/main">
   <p:cSld>
     <p:spTree>
@@ -8698,7 +9618,7 @@
 </p:sld>
 </file>
 
-<file path=ppt/slides/slide16.xml><?xml version="1.0" encoding="utf-8"?>
+<file path=ppt/slides/slide17.xml><?xml version="1.0" encoding="utf-8"?>
 <p:sld xmlns:a="http://schemas.openxmlformats.org/drawingml/2006/main" xmlns:r="http://schemas.openxmlformats.org/officeDocument/2006/relationships" xmlns:p="http://schemas.openxmlformats.org/presentationml/2006/main">
   <p:cSld>
     <p:spTree>
@@ -9751,7 +10671,7 @@
 </p:sld>
 </file>
 
-<file path=ppt/slides/slide17.xml><?xml version="1.0" encoding="utf-8"?>
+<file path=ppt/slides/slide18.xml><?xml version="1.0" encoding="utf-8"?>
 <p:sld xmlns:a="http://schemas.openxmlformats.org/drawingml/2006/main" xmlns:r="http://schemas.openxmlformats.org/officeDocument/2006/relationships" xmlns:p="http://schemas.openxmlformats.org/presentationml/2006/main">
   <p:cSld>
     <p:spTree>
@@ -10849,7 +11769,7 @@
 </p:sld>
 </file>
 
-<file path=ppt/slides/slide18.xml><?xml version="1.0" encoding="utf-8"?>
+<file path=ppt/slides/slide19.xml><?xml version="1.0" encoding="utf-8"?>
 <p:sld xmlns:a="http://schemas.openxmlformats.org/drawingml/2006/main" xmlns:r="http://schemas.openxmlformats.org/officeDocument/2006/relationships" xmlns:p="http://schemas.openxmlformats.org/presentationml/2006/main">
   <p:cSld>
     <p:spTree>
@@ -10945,509 +11865,6 @@
     <p:extLst>
       <p:ext uri="{BB962C8B-B14F-4D97-AF65-F5344CB8AC3E}">
         <p14:creationId xmlns:p14="http://schemas.microsoft.com/office/powerpoint/2010/main" val="2294899125"/>
-      </p:ext>
-    </p:extLst>
-  </p:cSld>
-  <p:clrMapOvr>
-    <a:masterClrMapping/>
-  </p:clrMapOvr>
-</p:sld>
-</file>
-
-<file path=ppt/slides/slide19.xml><?xml version="1.0" encoding="utf-8"?>
-<p:sld xmlns:a="http://schemas.openxmlformats.org/drawingml/2006/main" xmlns:r="http://schemas.openxmlformats.org/officeDocument/2006/relationships" xmlns:p="http://schemas.openxmlformats.org/presentationml/2006/main">
-  <p:cSld>
-    <p:spTree>
-      <p:nvGrpSpPr>
-        <p:cNvPr id="1" name=""/>
-        <p:cNvGrpSpPr/>
-        <p:nvPr/>
-      </p:nvGrpSpPr>
-      <p:grpSpPr>
-        <a:xfrm>
-          <a:off x="0" y="0"/>
-          <a:ext cx="0" cy="0"/>
-          <a:chOff x="0" y="0"/>
-          <a:chExt cx="0" cy="0"/>
-        </a:xfrm>
-      </p:grpSpPr>
-      <p:graphicFrame>
-        <p:nvGraphicFramePr>
-          <p:cNvPr id="3" name="Table 2">
-            <a:extLst>
-              <a:ext uri="{FF2B5EF4-FFF2-40B4-BE49-F238E27FC236}">
-                <a16:creationId xmlns:a16="http://schemas.microsoft.com/office/drawing/2014/main" id="{03F1EEA0-A364-F98B-0E07-0B3F1D7E5822}"/>
-              </a:ext>
-            </a:extLst>
-          </p:cNvPr>
-          <p:cNvGraphicFramePr>
-            <a:graphicFrameLocks noGrp="1"/>
-          </p:cNvGraphicFramePr>
-          <p:nvPr>
-            <p:extLst>
-              <p:ext uri="{D42A27DB-BD31-4B8C-83A1-F6EECF244321}">
-                <p14:modId xmlns:p14="http://schemas.microsoft.com/office/powerpoint/2010/main" val="3906354249"/>
-              </p:ext>
-            </p:extLst>
-          </p:nvPr>
-        </p:nvGraphicFramePr>
-        <p:xfrm>
-          <a:off x="228600" y="863600"/>
-          <a:ext cx="8559799" cy="4978400"/>
-        </p:xfrm>
-        <a:graphic>
-          <a:graphicData uri="http://schemas.openxmlformats.org/drawingml/2006/table">
-            <a:tbl>
-              <a:tblPr firstRow="1" firstCol="1" bandRow="1">
-                <a:tableStyleId>{5C22544A-7EE6-4342-B048-85BDC9FD1C3A}</a:tableStyleId>
-              </a:tblPr>
-              <a:tblGrid>
-                <a:gridCol w="1498600">
-                  <a:extLst>
-                    <a:ext uri="{9D8B030D-6E8A-4147-A177-3AD203B41FA5}">
-                      <a16:colId xmlns:a16="http://schemas.microsoft.com/office/drawing/2014/main" val="2893626722"/>
-                    </a:ext>
-                  </a:extLst>
-                </a:gridCol>
-                <a:gridCol w="2353733">
-                  <a:extLst>
-                    <a:ext uri="{9D8B030D-6E8A-4147-A177-3AD203B41FA5}">
-                      <a16:colId xmlns:a16="http://schemas.microsoft.com/office/drawing/2014/main" val="3069293214"/>
-                    </a:ext>
-                  </a:extLst>
-                </a:gridCol>
-                <a:gridCol w="2353733">
-                  <a:extLst>
-                    <a:ext uri="{9D8B030D-6E8A-4147-A177-3AD203B41FA5}">
-                      <a16:colId xmlns:a16="http://schemas.microsoft.com/office/drawing/2014/main" val="150902809"/>
-                    </a:ext>
-                  </a:extLst>
-                </a:gridCol>
-                <a:gridCol w="2353733">
-                  <a:extLst>
-                    <a:ext uri="{9D8B030D-6E8A-4147-A177-3AD203B41FA5}">
-                      <a16:colId xmlns:a16="http://schemas.microsoft.com/office/drawing/2014/main" val="3981404648"/>
-                    </a:ext>
-                  </a:extLst>
-                </a:gridCol>
-              </a:tblGrid>
-              <a:tr h="1244600">
-                <a:tc>
-                  <a:txBody>
-                    <a:bodyPr/>
-                    <a:lstStyle/>
-                    <a:p>
-                      <a:pPr algn="ctr"/>
-                      <a:endParaRPr lang="en-CA" sz="2800" dirty="0"/>
-                    </a:p>
-                  </a:txBody>
-                  <a:tcPr anchor="ctr">
-                    <a:noFill/>
-                  </a:tcPr>
-                </a:tc>
-                <a:tc>
-                  <a:txBody>
-                    <a:bodyPr/>
-                    <a:lstStyle/>
-                    <a:p>
-                      <a:pPr algn="ctr"/>
-                      <a:r>
-                        <a:rPr lang="en-CA" sz="2800" dirty="0"/>
-                        <a:t>Series 0</a:t>
-                      </a:r>
-                    </a:p>
-                  </a:txBody>
-                  <a:tcPr anchor="ctr"/>
-                </a:tc>
-                <a:tc>
-                  <a:txBody>
-                    <a:bodyPr/>
-                    <a:lstStyle/>
-                    <a:p>
-                      <a:pPr algn="ctr"/>
-                      <a:r>
-                        <a:rPr lang="en-CA" sz="2800" dirty="0"/>
-                        <a:t>Series 1</a:t>
-                      </a:r>
-                    </a:p>
-                  </a:txBody>
-                  <a:tcPr anchor="ctr"/>
-                </a:tc>
-                <a:tc>
-                  <a:txBody>
-                    <a:bodyPr/>
-                    <a:lstStyle/>
-                    <a:p>
-                      <a:pPr algn="ctr"/>
-                      <a:r>
-                        <a:rPr lang="en-CA" sz="2800" dirty="0"/>
-                        <a:t>Series 2</a:t>
-                      </a:r>
-                    </a:p>
-                  </a:txBody>
-                  <a:tcPr anchor="ctr"/>
-                </a:tc>
-                <a:extLst>
-                  <a:ext uri="{0D108BD9-81ED-4DB2-BD59-A6C34878D82A}">
-                    <a16:rowId xmlns:a16="http://schemas.microsoft.com/office/drawing/2014/main" val="1353461825"/>
-                  </a:ext>
-                </a:extLst>
-              </a:tr>
-              <a:tr h="1244600">
-                <a:tc>
-                  <a:txBody>
-                    <a:bodyPr/>
-                    <a:lstStyle/>
-                    <a:p>
-                      <a:pPr algn="ctr"/>
-                      <a:r>
-                        <a:rPr lang="en-CA" sz="2800" dirty="0"/>
-                        <a:t>Row 0</a:t>
-                      </a:r>
-                    </a:p>
-                  </a:txBody>
-                  <a:tcPr anchor="ctr"/>
-                </a:tc>
-                <a:tc>
-                  <a:txBody>
-                    <a:bodyPr/>
-                    <a:lstStyle/>
-                    <a:p>
-                      <a:pPr algn="ctr"/>
-                      <a:r>
-                        <a:rPr lang="en-CA" sz="1800" dirty="0">
-                          <a:latin typeface="Aptos Mono" panose="020B0009020202020204" pitchFamily="49" charset="0"/>
-                        </a:rPr>
-                        <a:t>[“row 0”, “series 0”]</a:t>
-                      </a:r>
-                    </a:p>
-                  </a:txBody>
-                  <a:tcPr anchor="ctr"/>
-                </a:tc>
-                <a:tc>
-                  <a:txBody>
-                    <a:bodyPr/>
-                    <a:lstStyle/>
-                    <a:p>
-                      <a:pPr marL="0" marR="0" lvl="0" indent="0" algn="ctr" defTabSz="914175" rtl="0" eaLnBrk="1" fontAlgn="auto" latinLnBrk="0" hangingPunct="1">
-                        <a:lnSpc>
-                          <a:spcPct val="100000"/>
-                        </a:lnSpc>
-                        <a:spcBef>
-                          <a:spcPts val="0"/>
-                        </a:spcBef>
-                        <a:spcAft>
-                          <a:spcPts val="0"/>
-                        </a:spcAft>
-                        <a:buClrTx/>
-                        <a:buSzTx/>
-                        <a:buFontTx/>
-                        <a:buNone/>
-                        <a:tabLst/>
-                        <a:defRPr/>
-                      </a:pPr>
-                      <a:r>
-                        <a:rPr lang="en-CA" sz="1800" dirty="0">
-                          <a:latin typeface="Aptos Mono" panose="020B0009020202020204" pitchFamily="49" charset="0"/>
-                        </a:rPr>
-                        <a:t>[“row 0”, “series 1”]</a:t>
-                      </a:r>
-                    </a:p>
-                  </a:txBody>
-                  <a:tcPr anchor="ctr"/>
-                </a:tc>
-                <a:tc>
-                  <a:txBody>
-                    <a:bodyPr/>
-                    <a:lstStyle/>
-                    <a:p>
-                      <a:pPr marL="0" marR="0" lvl="0" indent="0" algn="ctr" defTabSz="914175" rtl="0" eaLnBrk="1" fontAlgn="auto" latinLnBrk="0" hangingPunct="1">
-                        <a:lnSpc>
-                          <a:spcPct val="100000"/>
-                        </a:lnSpc>
-                        <a:spcBef>
-                          <a:spcPts val="0"/>
-                        </a:spcBef>
-                        <a:spcAft>
-                          <a:spcPts val="0"/>
-                        </a:spcAft>
-                        <a:buClrTx/>
-                        <a:buSzTx/>
-                        <a:buFontTx/>
-                        <a:buNone/>
-                        <a:tabLst/>
-                        <a:defRPr/>
-                      </a:pPr>
-                      <a:r>
-                        <a:rPr lang="en-CA" sz="1800" dirty="0">
-                          <a:latin typeface="Aptos Mono" panose="020B0009020202020204" pitchFamily="49" charset="0"/>
-                        </a:rPr>
-                        <a:t>[“row 0”, “series 2”]</a:t>
-                      </a:r>
-                    </a:p>
-                  </a:txBody>
-                  <a:tcPr anchor="ctr"/>
-                </a:tc>
-                <a:extLst>
-                  <a:ext uri="{0D108BD9-81ED-4DB2-BD59-A6C34878D82A}">
-                    <a16:rowId xmlns:a16="http://schemas.microsoft.com/office/drawing/2014/main" val="3734566292"/>
-                  </a:ext>
-                </a:extLst>
-              </a:tr>
-              <a:tr h="1244600">
-                <a:tc>
-                  <a:txBody>
-                    <a:bodyPr/>
-                    <a:lstStyle/>
-                    <a:p>
-                      <a:pPr algn="ctr"/>
-                      <a:r>
-                        <a:rPr lang="en-CA" sz="2800" dirty="0"/>
-                        <a:t>Row 1</a:t>
-                      </a:r>
-                    </a:p>
-                  </a:txBody>
-                  <a:tcPr anchor="ctr"/>
-                </a:tc>
-                <a:tc>
-                  <a:txBody>
-                    <a:bodyPr/>
-                    <a:lstStyle/>
-                    <a:p>
-                      <a:pPr marL="0" marR="0" lvl="0" indent="0" algn="ctr" defTabSz="914175" rtl="0" eaLnBrk="1" fontAlgn="auto" latinLnBrk="0" hangingPunct="1">
-                        <a:lnSpc>
-                          <a:spcPct val="100000"/>
-                        </a:lnSpc>
-                        <a:spcBef>
-                          <a:spcPts val="0"/>
-                        </a:spcBef>
-                        <a:spcAft>
-                          <a:spcPts val="0"/>
-                        </a:spcAft>
-                        <a:buClrTx/>
-                        <a:buSzTx/>
-                        <a:buFontTx/>
-                        <a:buNone/>
-                        <a:tabLst/>
-                        <a:defRPr/>
-                      </a:pPr>
-                      <a:r>
-                        <a:rPr lang="en-CA" sz="1800" dirty="0">
-                          <a:latin typeface="Aptos Mono" panose="020B0009020202020204" pitchFamily="49" charset="0"/>
-                        </a:rPr>
-                        <a:t>[“row 1”, “series 0”]</a:t>
-                      </a:r>
-                    </a:p>
-                  </a:txBody>
-                  <a:tcPr anchor="ctr"/>
-                </a:tc>
-                <a:tc>
-                  <a:txBody>
-                    <a:bodyPr/>
-                    <a:lstStyle/>
-                    <a:p>
-                      <a:pPr algn="ctr"/>
-                      <a:r>
-                        <a:rPr lang="en-CA" sz="1800" dirty="0">
-                          <a:latin typeface="Aptos Mono" panose="020B0009020202020204" pitchFamily="49" charset="0"/>
-                        </a:rPr>
-                        <a:t>[“row 1”, “series 1”]</a:t>
-                      </a:r>
-                    </a:p>
-                  </a:txBody>
-                  <a:tcPr anchor="ctr"/>
-                </a:tc>
-                <a:tc>
-                  <a:txBody>
-                    <a:bodyPr/>
-                    <a:lstStyle/>
-                    <a:p>
-                      <a:pPr algn="ctr"/>
-                      <a:r>
-                        <a:rPr lang="en-CA" sz="1800" dirty="0">
-                          <a:latin typeface="Aptos Mono" panose="020B0009020202020204" pitchFamily="49" charset="0"/>
-                        </a:rPr>
-                        <a:t>[“row 1”, “series 2”]</a:t>
-                      </a:r>
-                    </a:p>
-                  </a:txBody>
-                  <a:tcPr anchor="ctr"/>
-                </a:tc>
-                <a:extLst>
-                  <a:ext uri="{0D108BD9-81ED-4DB2-BD59-A6C34878D82A}">
-                    <a16:rowId xmlns:a16="http://schemas.microsoft.com/office/drawing/2014/main" val="2214091798"/>
-                  </a:ext>
-                </a:extLst>
-              </a:tr>
-              <a:tr h="1244600">
-                <a:tc>
-                  <a:txBody>
-                    <a:bodyPr/>
-                    <a:lstStyle/>
-                    <a:p>
-                      <a:pPr algn="ctr"/>
-                      <a:r>
-                        <a:rPr lang="en-CA" sz="2800" dirty="0"/>
-                        <a:t>Row 2</a:t>
-                      </a:r>
-                    </a:p>
-                  </a:txBody>
-                  <a:tcPr anchor="ctr"/>
-                </a:tc>
-                <a:tc>
-                  <a:txBody>
-                    <a:bodyPr/>
-                    <a:lstStyle/>
-                    <a:p>
-                      <a:pPr marL="0" marR="0" lvl="0" indent="0" algn="ctr" defTabSz="914175" rtl="0" eaLnBrk="1" fontAlgn="auto" latinLnBrk="0" hangingPunct="1">
-                        <a:lnSpc>
-                          <a:spcPct val="100000"/>
-                        </a:lnSpc>
-                        <a:spcBef>
-                          <a:spcPts val="0"/>
-                        </a:spcBef>
-                        <a:spcAft>
-                          <a:spcPts val="0"/>
-                        </a:spcAft>
-                        <a:buClrTx/>
-                        <a:buSzTx/>
-                        <a:buFontTx/>
-                        <a:buNone/>
-                        <a:tabLst/>
-                        <a:defRPr/>
-                      </a:pPr>
-                      <a:r>
-                        <a:rPr lang="en-CA" sz="1800" dirty="0">
-                          <a:latin typeface="Aptos Mono" panose="020B0009020202020204" pitchFamily="49" charset="0"/>
-                        </a:rPr>
-                        <a:t>[“row 2”, “series 0”]</a:t>
-                      </a:r>
-                    </a:p>
-                  </a:txBody>
-                  <a:tcPr anchor="ctr"/>
-                </a:tc>
-                <a:tc>
-                  <a:txBody>
-                    <a:bodyPr/>
-                    <a:lstStyle/>
-                    <a:p>
-                      <a:pPr marL="0" marR="0" lvl="0" indent="0" algn="ctr" defTabSz="914175" rtl="0" eaLnBrk="1" fontAlgn="auto" latinLnBrk="0" hangingPunct="1">
-                        <a:lnSpc>
-                          <a:spcPct val="100000"/>
-                        </a:lnSpc>
-                        <a:spcBef>
-                          <a:spcPts val="0"/>
-                        </a:spcBef>
-                        <a:spcAft>
-                          <a:spcPts val="0"/>
-                        </a:spcAft>
-                        <a:buClrTx/>
-                        <a:buSzTx/>
-                        <a:buFontTx/>
-                        <a:buNone/>
-                        <a:tabLst/>
-                        <a:defRPr/>
-                      </a:pPr>
-                      <a:r>
-                        <a:rPr lang="en-CA" sz="1800" dirty="0">
-                          <a:latin typeface="Aptos Mono" panose="020B0009020202020204" pitchFamily="49" charset="0"/>
-                        </a:rPr>
-                        <a:t>[“row 2”, “series 1”]</a:t>
-                      </a:r>
-                    </a:p>
-                  </a:txBody>
-                  <a:tcPr anchor="ctr"/>
-                </a:tc>
-                <a:tc>
-                  <a:txBody>
-                    <a:bodyPr/>
-                    <a:lstStyle/>
-                    <a:p>
-                      <a:pPr marL="0" marR="0" lvl="0" indent="0" algn="ctr" defTabSz="914175" rtl="0" eaLnBrk="1" fontAlgn="auto" latinLnBrk="0" hangingPunct="1">
-                        <a:lnSpc>
-                          <a:spcPct val="100000"/>
-                        </a:lnSpc>
-                        <a:spcBef>
-                          <a:spcPts val="0"/>
-                        </a:spcBef>
-                        <a:spcAft>
-                          <a:spcPts val="0"/>
-                        </a:spcAft>
-                        <a:buClrTx/>
-                        <a:buSzTx/>
-                        <a:buFontTx/>
-                        <a:buNone/>
-                        <a:tabLst/>
-                        <a:defRPr/>
-                      </a:pPr>
-                      <a:r>
-                        <a:rPr lang="en-CA" sz="1800" dirty="0">
-                          <a:latin typeface="Aptos Mono" panose="020B0009020202020204" pitchFamily="49" charset="0"/>
-                        </a:rPr>
-                        <a:t>[“row 2”, “series 2”]</a:t>
-                      </a:r>
-                    </a:p>
-                  </a:txBody>
-                  <a:tcPr anchor="ctr"/>
-                </a:tc>
-                <a:extLst>
-                  <a:ext uri="{0D108BD9-81ED-4DB2-BD59-A6C34878D82A}">
-                    <a16:rowId xmlns:a16="http://schemas.microsoft.com/office/drawing/2014/main" val="2383002064"/>
-                  </a:ext>
-                </a:extLst>
-              </a:tr>
-            </a:tbl>
-          </a:graphicData>
-        </a:graphic>
-      </p:graphicFrame>
-      <p:sp>
-        <p:nvSpPr>
-          <p:cNvPr id="4" name="TextBox 3">
-            <a:extLst>
-              <a:ext uri="{FF2B5EF4-FFF2-40B4-BE49-F238E27FC236}">
-                <a16:creationId xmlns:a16="http://schemas.microsoft.com/office/drawing/2014/main" id="{C35D3024-DD65-6BA2-0AD2-49EDE78B2794}"/>
-              </a:ext>
-            </a:extLst>
-          </p:cNvPr>
-          <p:cNvSpPr txBox="1"/>
-          <p:nvPr/>
-        </p:nvSpPr>
-        <p:spPr>
-          <a:xfrm>
-            <a:off x="228600" y="165100"/>
-            <a:ext cx="4053482" cy="584775"/>
-          </a:xfrm>
-          <a:prstGeom prst="rect">
-            <a:avLst/>
-          </a:prstGeom>
-          <a:noFill/>
-        </p:spPr>
-        <p:txBody>
-          <a:bodyPr wrap="none" rtlCol="0">
-            <a:spAutoFit/>
-          </a:bodyPr>
-          <a:lstStyle/>
-          <a:p>
-            <a:r>
-              <a:rPr lang="en-CA" sz="3200" dirty="0"/>
-              <a:t>By name: </a:t>
-            </a:r>
-            <a:r>
-              <a:rPr lang="en-CA" sz="3200" dirty="0" err="1">
-                <a:latin typeface="Aptos Mono" panose="020B0009020202020204" pitchFamily="49" charset="0"/>
-              </a:rPr>
-              <a:t>my_df.loc</a:t>
-            </a:r>
-            <a:endParaRPr lang="en-CA" sz="3200" dirty="0">
-              <a:latin typeface="Aptos Mono" panose="020B0009020202020204" pitchFamily="49" charset="0"/>
-            </a:endParaRPr>
-          </a:p>
-        </p:txBody>
-      </p:sp>
-    </p:spTree>
-    <p:extLst>
-      <p:ext uri="{BB962C8B-B14F-4D97-AF65-F5344CB8AC3E}">
-        <p14:creationId xmlns:p14="http://schemas.microsoft.com/office/powerpoint/2010/main" val="38499322"/>
       </p:ext>
     </p:extLst>
   </p:cSld>
@@ -11798,6 +12215,509 @@
   <p:cSld>
     <p:spTree>
       <p:nvGrpSpPr>
+        <p:cNvPr id="1" name=""/>
+        <p:cNvGrpSpPr/>
+        <p:nvPr/>
+      </p:nvGrpSpPr>
+      <p:grpSpPr>
+        <a:xfrm>
+          <a:off x="0" y="0"/>
+          <a:ext cx="0" cy="0"/>
+          <a:chOff x="0" y="0"/>
+          <a:chExt cx="0" cy="0"/>
+        </a:xfrm>
+      </p:grpSpPr>
+      <p:graphicFrame>
+        <p:nvGraphicFramePr>
+          <p:cNvPr id="3" name="Table 2">
+            <a:extLst>
+              <a:ext uri="{FF2B5EF4-FFF2-40B4-BE49-F238E27FC236}">
+                <a16:creationId xmlns:a16="http://schemas.microsoft.com/office/drawing/2014/main" id="{03F1EEA0-A364-F98B-0E07-0B3F1D7E5822}"/>
+              </a:ext>
+            </a:extLst>
+          </p:cNvPr>
+          <p:cNvGraphicFramePr>
+            <a:graphicFrameLocks noGrp="1"/>
+          </p:cNvGraphicFramePr>
+          <p:nvPr>
+            <p:extLst>
+              <p:ext uri="{D42A27DB-BD31-4B8C-83A1-F6EECF244321}">
+                <p14:modId xmlns:p14="http://schemas.microsoft.com/office/powerpoint/2010/main" val="3906354249"/>
+              </p:ext>
+            </p:extLst>
+          </p:nvPr>
+        </p:nvGraphicFramePr>
+        <p:xfrm>
+          <a:off x="228600" y="863600"/>
+          <a:ext cx="8559799" cy="4978400"/>
+        </p:xfrm>
+        <a:graphic>
+          <a:graphicData uri="http://schemas.openxmlformats.org/drawingml/2006/table">
+            <a:tbl>
+              <a:tblPr firstRow="1" firstCol="1" bandRow="1">
+                <a:tableStyleId>{5C22544A-7EE6-4342-B048-85BDC9FD1C3A}</a:tableStyleId>
+              </a:tblPr>
+              <a:tblGrid>
+                <a:gridCol w="1498600">
+                  <a:extLst>
+                    <a:ext uri="{9D8B030D-6E8A-4147-A177-3AD203B41FA5}">
+                      <a16:colId xmlns:a16="http://schemas.microsoft.com/office/drawing/2014/main" val="2893626722"/>
+                    </a:ext>
+                  </a:extLst>
+                </a:gridCol>
+                <a:gridCol w="2353733">
+                  <a:extLst>
+                    <a:ext uri="{9D8B030D-6E8A-4147-A177-3AD203B41FA5}">
+                      <a16:colId xmlns:a16="http://schemas.microsoft.com/office/drawing/2014/main" val="3069293214"/>
+                    </a:ext>
+                  </a:extLst>
+                </a:gridCol>
+                <a:gridCol w="2353733">
+                  <a:extLst>
+                    <a:ext uri="{9D8B030D-6E8A-4147-A177-3AD203B41FA5}">
+                      <a16:colId xmlns:a16="http://schemas.microsoft.com/office/drawing/2014/main" val="150902809"/>
+                    </a:ext>
+                  </a:extLst>
+                </a:gridCol>
+                <a:gridCol w="2353733">
+                  <a:extLst>
+                    <a:ext uri="{9D8B030D-6E8A-4147-A177-3AD203B41FA5}">
+                      <a16:colId xmlns:a16="http://schemas.microsoft.com/office/drawing/2014/main" val="3981404648"/>
+                    </a:ext>
+                  </a:extLst>
+                </a:gridCol>
+              </a:tblGrid>
+              <a:tr h="1244600">
+                <a:tc>
+                  <a:txBody>
+                    <a:bodyPr/>
+                    <a:lstStyle/>
+                    <a:p>
+                      <a:pPr algn="ctr"/>
+                      <a:endParaRPr lang="en-CA" sz="2800" dirty="0"/>
+                    </a:p>
+                  </a:txBody>
+                  <a:tcPr anchor="ctr">
+                    <a:noFill/>
+                  </a:tcPr>
+                </a:tc>
+                <a:tc>
+                  <a:txBody>
+                    <a:bodyPr/>
+                    <a:lstStyle/>
+                    <a:p>
+                      <a:pPr algn="ctr"/>
+                      <a:r>
+                        <a:rPr lang="en-CA" sz="2800" dirty="0"/>
+                        <a:t>Series 0</a:t>
+                      </a:r>
+                    </a:p>
+                  </a:txBody>
+                  <a:tcPr anchor="ctr"/>
+                </a:tc>
+                <a:tc>
+                  <a:txBody>
+                    <a:bodyPr/>
+                    <a:lstStyle/>
+                    <a:p>
+                      <a:pPr algn="ctr"/>
+                      <a:r>
+                        <a:rPr lang="en-CA" sz="2800" dirty="0"/>
+                        <a:t>Series 1</a:t>
+                      </a:r>
+                    </a:p>
+                  </a:txBody>
+                  <a:tcPr anchor="ctr"/>
+                </a:tc>
+                <a:tc>
+                  <a:txBody>
+                    <a:bodyPr/>
+                    <a:lstStyle/>
+                    <a:p>
+                      <a:pPr algn="ctr"/>
+                      <a:r>
+                        <a:rPr lang="en-CA" sz="2800" dirty="0"/>
+                        <a:t>Series 2</a:t>
+                      </a:r>
+                    </a:p>
+                  </a:txBody>
+                  <a:tcPr anchor="ctr"/>
+                </a:tc>
+                <a:extLst>
+                  <a:ext uri="{0D108BD9-81ED-4DB2-BD59-A6C34878D82A}">
+                    <a16:rowId xmlns:a16="http://schemas.microsoft.com/office/drawing/2014/main" val="1353461825"/>
+                  </a:ext>
+                </a:extLst>
+              </a:tr>
+              <a:tr h="1244600">
+                <a:tc>
+                  <a:txBody>
+                    <a:bodyPr/>
+                    <a:lstStyle/>
+                    <a:p>
+                      <a:pPr algn="ctr"/>
+                      <a:r>
+                        <a:rPr lang="en-CA" sz="2800" dirty="0"/>
+                        <a:t>Row 0</a:t>
+                      </a:r>
+                    </a:p>
+                  </a:txBody>
+                  <a:tcPr anchor="ctr"/>
+                </a:tc>
+                <a:tc>
+                  <a:txBody>
+                    <a:bodyPr/>
+                    <a:lstStyle/>
+                    <a:p>
+                      <a:pPr algn="ctr"/>
+                      <a:r>
+                        <a:rPr lang="en-CA" sz="1800" dirty="0">
+                          <a:latin typeface="Aptos Mono" panose="020B0009020202020204" pitchFamily="49" charset="0"/>
+                        </a:rPr>
+                        <a:t>[“row 0”, “series 0”]</a:t>
+                      </a:r>
+                    </a:p>
+                  </a:txBody>
+                  <a:tcPr anchor="ctr"/>
+                </a:tc>
+                <a:tc>
+                  <a:txBody>
+                    <a:bodyPr/>
+                    <a:lstStyle/>
+                    <a:p>
+                      <a:pPr marL="0" marR="0" lvl="0" indent="0" algn="ctr" defTabSz="914175" rtl="0" eaLnBrk="1" fontAlgn="auto" latinLnBrk="0" hangingPunct="1">
+                        <a:lnSpc>
+                          <a:spcPct val="100000"/>
+                        </a:lnSpc>
+                        <a:spcBef>
+                          <a:spcPts val="0"/>
+                        </a:spcBef>
+                        <a:spcAft>
+                          <a:spcPts val="0"/>
+                        </a:spcAft>
+                        <a:buClrTx/>
+                        <a:buSzTx/>
+                        <a:buFontTx/>
+                        <a:buNone/>
+                        <a:tabLst/>
+                        <a:defRPr/>
+                      </a:pPr>
+                      <a:r>
+                        <a:rPr lang="en-CA" sz="1800" dirty="0">
+                          <a:latin typeface="Aptos Mono" panose="020B0009020202020204" pitchFamily="49" charset="0"/>
+                        </a:rPr>
+                        <a:t>[“row 0”, “series 1”]</a:t>
+                      </a:r>
+                    </a:p>
+                  </a:txBody>
+                  <a:tcPr anchor="ctr"/>
+                </a:tc>
+                <a:tc>
+                  <a:txBody>
+                    <a:bodyPr/>
+                    <a:lstStyle/>
+                    <a:p>
+                      <a:pPr marL="0" marR="0" lvl="0" indent="0" algn="ctr" defTabSz="914175" rtl="0" eaLnBrk="1" fontAlgn="auto" latinLnBrk="0" hangingPunct="1">
+                        <a:lnSpc>
+                          <a:spcPct val="100000"/>
+                        </a:lnSpc>
+                        <a:spcBef>
+                          <a:spcPts val="0"/>
+                        </a:spcBef>
+                        <a:spcAft>
+                          <a:spcPts val="0"/>
+                        </a:spcAft>
+                        <a:buClrTx/>
+                        <a:buSzTx/>
+                        <a:buFontTx/>
+                        <a:buNone/>
+                        <a:tabLst/>
+                        <a:defRPr/>
+                      </a:pPr>
+                      <a:r>
+                        <a:rPr lang="en-CA" sz="1800" dirty="0">
+                          <a:latin typeface="Aptos Mono" panose="020B0009020202020204" pitchFamily="49" charset="0"/>
+                        </a:rPr>
+                        <a:t>[“row 0”, “series 2”]</a:t>
+                      </a:r>
+                    </a:p>
+                  </a:txBody>
+                  <a:tcPr anchor="ctr"/>
+                </a:tc>
+                <a:extLst>
+                  <a:ext uri="{0D108BD9-81ED-4DB2-BD59-A6C34878D82A}">
+                    <a16:rowId xmlns:a16="http://schemas.microsoft.com/office/drawing/2014/main" val="3734566292"/>
+                  </a:ext>
+                </a:extLst>
+              </a:tr>
+              <a:tr h="1244600">
+                <a:tc>
+                  <a:txBody>
+                    <a:bodyPr/>
+                    <a:lstStyle/>
+                    <a:p>
+                      <a:pPr algn="ctr"/>
+                      <a:r>
+                        <a:rPr lang="en-CA" sz="2800" dirty="0"/>
+                        <a:t>Row 1</a:t>
+                      </a:r>
+                    </a:p>
+                  </a:txBody>
+                  <a:tcPr anchor="ctr"/>
+                </a:tc>
+                <a:tc>
+                  <a:txBody>
+                    <a:bodyPr/>
+                    <a:lstStyle/>
+                    <a:p>
+                      <a:pPr marL="0" marR="0" lvl="0" indent="0" algn="ctr" defTabSz="914175" rtl="0" eaLnBrk="1" fontAlgn="auto" latinLnBrk="0" hangingPunct="1">
+                        <a:lnSpc>
+                          <a:spcPct val="100000"/>
+                        </a:lnSpc>
+                        <a:spcBef>
+                          <a:spcPts val="0"/>
+                        </a:spcBef>
+                        <a:spcAft>
+                          <a:spcPts val="0"/>
+                        </a:spcAft>
+                        <a:buClrTx/>
+                        <a:buSzTx/>
+                        <a:buFontTx/>
+                        <a:buNone/>
+                        <a:tabLst/>
+                        <a:defRPr/>
+                      </a:pPr>
+                      <a:r>
+                        <a:rPr lang="en-CA" sz="1800" dirty="0">
+                          <a:latin typeface="Aptos Mono" panose="020B0009020202020204" pitchFamily="49" charset="0"/>
+                        </a:rPr>
+                        <a:t>[“row 1”, “series 0”]</a:t>
+                      </a:r>
+                    </a:p>
+                  </a:txBody>
+                  <a:tcPr anchor="ctr"/>
+                </a:tc>
+                <a:tc>
+                  <a:txBody>
+                    <a:bodyPr/>
+                    <a:lstStyle/>
+                    <a:p>
+                      <a:pPr algn="ctr"/>
+                      <a:r>
+                        <a:rPr lang="en-CA" sz="1800" dirty="0">
+                          <a:latin typeface="Aptos Mono" panose="020B0009020202020204" pitchFamily="49" charset="0"/>
+                        </a:rPr>
+                        <a:t>[“row 1”, “series 1”]</a:t>
+                      </a:r>
+                    </a:p>
+                  </a:txBody>
+                  <a:tcPr anchor="ctr"/>
+                </a:tc>
+                <a:tc>
+                  <a:txBody>
+                    <a:bodyPr/>
+                    <a:lstStyle/>
+                    <a:p>
+                      <a:pPr algn="ctr"/>
+                      <a:r>
+                        <a:rPr lang="en-CA" sz="1800" dirty="0">
+                          <a:latin typeface="Aptos Mono" panose="020B0009020202020204" pitchFamily="49" charset="0"/>
+                        </a:rPr>
+                        <a:t>[“row 1”, “series 2”]</a:t>
+                      </a:r>
+                    </a:p>
+                  </a:txBody>
+                  <a:tcPr anchor="ctr"/>
+                </a:tc>
+                <a:extLst>
+                  <a:ext uri="{0D108BD9-81ED-4DB2-BD59-A6C34878D82A}">
+                    <a16:rowId xmlns:a16="http://schemas.microsoft.com/office/drawing/2014/main" val="2214091798"/>
+                  </a:ext>
+                </a:extLst>
+              </a:tr>
+              <a:tr h="1244600">
+                <a:tc>
+                  <a:txBody>
+                    <a:bodyPr/>
+                    <a:lstStyle/>
+                    <a:p>
+                      <a:pPr algn="ctr"/>
+                      <a:r>
+                        <a:rPr lang="en-CA" sz="2800" dirty="0"/>
+                        <a:t>Row 2</a:t>
+                      </a:r>
+                    </a:p>
+                  </a:txBody>
+                  <a:tcPr anchor="ctr"/>
+                </a:tc>
+                <a:tc>
+                  <a:txBody>
+                    <a:bodyPr/>
+                    <a:lstStyle/>
+                    <a:p>
+                      <a:pPr marL="0" marR="0" lvl="0" indent="0" algn="ctr" defTabSz="914175" rtl="0" eaLnBrk="1" fontAlgn="auto" latinLnBrk="0" hangingPunct="1">
+                        <a:lnSpc>
+                          <a:spcPct val="100000"/>
+                        </a:lnSpc>
+                        <a:spcBef>
+                          <a:spcPts val="0"/>
+                        </a:spcBef>
+                        <a:spcAft>
+                          <a:spcPts val="0"/>
+                        </a:spcAft>
+                        <a:buClrTx/>
+                        <a:buSzTx/>
+                        <a:buFontTx/>
+                        <a:buNone/>
+                        <a:tabLst/>
+                        <a:defRPr/>
+                      </a:pPr>
+                      <a:r>
+                        <a:rPr lang="en-CA" sz="1800" dirty="0">
+                          <a:latin typeface="Aptos Mono" panose="020B0009020202020204" pitchFamily="49" charset="0"/>
+                        </a:rPr>
+                        <a:t>[“row 2”, “series 0”]</a:t>
+                      </a:r>
+                    </a:p>
+                  </a:txBody>
+                  <a:tcPr anchor="ctr"/>
+                </a:tc>
+                <a:tc>
+                  <a:txBody>
+                    <a:bodyPr/>
+                    <a:lstStyle/>
+                    <a:p>
+                      <a:pPr marL="0" marR="0" lvl="0" indent="0" algn="ctr" defTabSz="914175" rtl="0" eaLnBrk="1" fontAlgn="auto" latinLnBrk="0" hangingPunct="1">
+                        <a:lnSpc>
+                          <a:spcPct val="100000"/>
+                        </a:lnSpc>
+                        <a:spcBef>
+                          <a:spcPts val="0"/>
+                        </a:spcBef>
+                        <a:spcAft>
+                          <a:spcPts val="0"/>
+                        </a:spcAft>
+                        <a:buClrTx/>
+                        <a:buSzTx/>
+                        <a:buFontTx/>
+                        <a:buNone/>
+                        <a:tabLst/>
+                        <a:defRPr/>
+                      </a:pPr>
+                      <a:r>
+                        <a:rPr lang="en-CA" sz="1800" dirty="0">
+                          <a:latin typeface="Aptos Mono" panose="020B0009020202020204" pitchFamily="49" charset="0"/>
+                        </a:rPr>
+                        <a:t>[“row 2”, “series 1”]</a:t>
+                      </a:r>
+                    </a:p>
+                  </a:txBody>
+                  <a:tcPr anchor="ctr"/>
+                </a:tc>
+                <a:tc>
+                  <a:txBody>
+                    <a:bodyPr/>
+                    <a:lstStyle/>
+                    <a:p>
+                      <a:pPr marL="0" marR="0" lvl="0" indent="0" algn="ctr" defTabSz="914175" rtl="0" eaLnBrk="1" fontAlgn="auto" latinLnBrk="0" hangingPunct="1">
+                        <a:lnSpc>
+                          <a:spcPct val="100000"/>
+                        </a:lnSpc>
+                        <a:spcBef>
+                          <a:spcPts val="0"/>
+                        </a:spcBef>
+                        <a:spcAft>
+                          <a:spcPts val="0"/>
+                        </a:spcAft>
+                        <a:buClrTx/>
+                        <a:buSzTx/>
+                        <a:buFontTx/>
+                        <a:buNone/>
+                        <a:tabLst/>
+                        <a:defRPr/>
+                      </a:pPr>
+                      <a:r>
+                        <a:rPr lang="en-CA" sz="1800" dirty="0">
+                          <a:latin typeface="Aptos Mono" panose="020B0009020202020204" pitchFamily="49" charset="0"/>
+                        </a:rPr>
+                        <a:t>[“row 2”, “series 2”]</a:t>
+                      </a:r>
+                    </a:p>
+                  </a:txBody>
+                  <a:tcPr anchor="ctr"/>
+                </a:tc>
+                <a:extLst>
+                  <a:ext uri="{0D108BD9-81ED-4DB2-BD59-A6C34878D82A}">
+                    <a16:rowId xmlns:a16="http://schemas.microsoft.com/office/drawing/2014/main" val="2383002064"/>
+                  </a:ext>
+                </a:extLst>
+              </a:tr>
+            </a:tbl>
+          </a:graphicData>
+        </a:graphic>
+      </p:graphicFrame>
+      <p:sp>
+        <p:nvSpPr>
+          <p:cNvPr id="4" name="TextBox 3">
+            <a:extLst>
+              <a:ext uri="{FF2B5EF4-FFF2-40B4-BE49-F238E27FC236}">
+                <a16:creationId xmlns:a16="http://schemas.microsoft.com/office/drawing/2014/main" id="{C35D3024-DD65-6BA2-0AD2-49EDE78B2794}"/>
+              </a:ext>
+            </a:extLst>
+          </p:cNvPr>
+          <p:cNvSpPr txBox="1"/>
+          <p:nvPr/>
+        </p:nvSpPr>
+        <p:spPr>
+          <a:xfrm>
+            <a:off x="228600" y="165100"/>
+            <a:ext cx="4053482" cy="584775"/>
+          </a:xfrm>
+          <a:prstGeom prst="rect">
+            <a:avLst/>
+          </a:prstGeom>
+          <a:noFill/>
+        </p:spPr>
+        <p:txBody>
+          <a:bodyPr wrap="none" rtlCol="0">
+            <a:spAutoFit/>
+          </a:bodyPr>
+          <a:lstStyle/>
+          <a:p>
+            <a:r>
+              <a:rPr lang="en-CA" sz="3200" dirty="0"/>
+              <a:t>By name: </a:t>
+            </a:r>
+            <a:r>
+              <a:rPr lang="en-CA" sz="3200" dirty="0" err="1">
+                <a:latin typeface="Aptos Mono" panose="020B0009020202020204" pitchFamily="49" charset="0"/>
+              </a:rPr>
+              <a:t>my_df.loc</a:t>
+            </a:r>
+            <a:endParaRPr lang="en-CA" sz="3200" dirty="0">
+              <a:latin typeface="Aptos Mono" panose="020B0009020202020204" pitchFamily="49" charset="0"/>
+            </a:endParaRPr>
+          </a:p>
+        </p:txBody>
+      </p:sp>
+    </p:spTree>
+    <p:extLst>
+      <p:ext uri="{BB962C8B-B14F-4D97-AF65-F5344CB8AC3E}">
+        <p14:creationId xmlns:p14="http://schemas.microsoft.com/office/powerpoint/2010/main" val="38499322"/>
+      </p:ext>
+    </p:extLst>
+  </p:cSld>
+  <p:clrMapOvr>
+    <a:masterClrMapping/>
+  </p:clrMapOvr>
+</p:sld>
+</file>
+
+<file path=ppt/slides/slide21.xml><?xml version="1.0" encoding="utf-8"?>
+<p:sld xmlns:a="http://schemas.openxmlformats.org/drawingml/2006/main" xmlns:r="http://schemas.openxmlformats.org/officeDocument/2006/relationships" xmlns:p="http://schemas.openxmlformats.org/presentationml/2006/main">
+  <p:cSld>
+    <p:spTree>
+      <p:nvGrpSpPr>
         <p:cNvPr id="1" name="">
           <a:extLst>
             <a:ext uri="{FF2B5EF4-FFF2-40B4-BE49-F238E27FC236}">
@@ -12434,7 +13354,7 @@
 </p:sld>
 </file>
 
-<file path=ppt/slides/slide21.xml><?xml version="1.0" encoding="utf-8"?>
+<file path=ppt/slides/slide22.xml><?xml version="1.0" encoding="utf-8"?>
 <p:sld xmlns:a="http://schemas.openxmlformats.org/drawingml/2006/main" xmlns:r="http://schemas.openxmlformats.org/officeDocument/2006/relationships" xmlns:p="http://schemas.openxmlformats.org/presentationml/2006/main">
   <p:cSld>
     <p:spTree>
@@ -12814,7 +13734,7 @@
 </p:sld>
 </file>
 
-<file path=ppt/slides/slide22.xml><?xml version="1.0" encoding="utf-8"?>
+<file path=ppt/slides/slide23.xml><?xml version="1.0" encoding="utf-8"?>
 <p:sld xmlns:a="http://schemas.openxmlformats.org/drawingml/2006/main" xmlns:r="http://schemas.openxmlformats.org/officeDocument/2006/relationships" xmlns:p="http://schemas.openxmlformats.org/presentationml/2006/main">
   <p:cSld>
     <p:spTree>
@@ -13089,6 +14009,303 @@
 </file>
 
 <file path=ppt/slides/slide4.xml><?xml version="1.0" encoding="utf-8"?>
+<p:sld xmlns:a="http://schemas.openxmlformats.org/drawingml/2006/main" xmlns:r="http://schemas.openxmlformats.org/officeDocument/2006/relationships" xmlns:p="http://schemas.openxmlformats.org/presentationml/2006/main">
+  <p:cSld>
+    <p:spTree>
+      <p:nvGrpSpPr>
+        <p:cNvPr id="1" name=""/>
+        <p:cNvGrpSpPr/>
+        <p:nvPr/>
+      </p:nvGrpSpPr>
+      <p:grpSpPr>
+        <a:xfrm>
+          <a:off x="0" y="0"/>
+          <a:ext cx="0" cy="0"/>
+          <a:chOff x="0" y="0"/>
+          <a:chExt cx="0" cy="0"/>
+        </a:xfrm>
+      </p:grpSpPr>
+      <p:sp>
+        <p:nvSpPr>
+          <p:cNvPr id="2" name="Title 1">
+            <a:extLst>
+              <a:ext uri="{FF2B5EF4-FFF2-40B4-BE49-F238E27FC236}">
+                <a16:creationId xmlns:a16="http://schemas.microsoft.com/office/drawing/2014/main" id="{858B6CB6-3AC9-DA48-BC60-CD6CCF2207F0}"/>
+              </a:ext>
+            </a:extLst>
+          </p:cNvPr>
+          <p:cNvSpPr>
+            <a:spLocks noGrp="1"/>
+          </p:cNvSpPr>
+          <p:nvPr>
+            <p:ph type="title"/>
+          </p:nvPr>
+        </p:nvSpPr>
+        <p:spPr>
+          <a:xfrm>
+            <a:off x="628650" y="149223"/>
+            <a:ext cx="7886700" cy="1325565"/>
+          </a:xfrm>
+        </p:spPr>
+        <p:txBody>
+          <a:bodyPr/>
+          <a:lstStyle/>
+          <a:p>
+            <a:r>
+              <a:rPr lang="en-CA" dirty="0">
+                <a:latin typeface="Arial" panose="020B0604020202020204" pitchFamily="34" charset="0"/>
+                <a:cs typeface="Arial" panose="020B0604020202020204" pitchFamily="34" charset="0"/>
+              </a:rPr>
+              <a:t>Learning Outcomes</a:t>
+            </a:r>
+          </a:p>
+        </p:txBody>
+      </p:sp>
+      <p:sp>
+        <p:nvSpPr>
+          <p:cNvPr id="3" name="Content Placeholder 2">
+            <a:extLst>
+              <a:ext uri="{FF2B5EF4-FFF2-40B4-BE49-F238E27FC236}">
+                <a16:creationId xmlns:a16="http://schemas.microsoft.com/office/drawing/2014/main" id="{D0E6AA13-8806-1A11-9DDC-664EEF2FB52B}"/>
+              </a:ext>
+            </a:extLst>
+          </p:cNvPr>
+          <p:cNvSpPr>
+            <a:spLocks noGrp="1"/>
+          </p:cNvSpPr>
+          <p:nvPr>
+            <p:ph idx="1"/>
+          </p:nvPr>
+        </p:nvSpPr>
+        <p:spPr>
+          <a:xfrm>
+            <a:off x="628650" y="1168400"/>
+            <a:ext cx="8337550" cy="5054600"/>
+          </a:xfrm>
+        </p:spPr>
+        <p:txBody>
+          <a:bodyPr>
+            <a:normAutofit lnSpcReduction="10000"/>
+          </a:bodyPr>
+          <a:lstStyle/>
+          <a:p>
+            <a:pPr marL="0" indent="0">
+              <a:lnSpc>
+                <a:spcPct val="120000"/>
+              </a:lnSpc>
+              <a:spcBef>
+                <a:spcPts val="0"/>
+              </a:spcBef>
+              <a:spcAft>
+                <a:spcPts val="600"/>
+              </a:spcAft>
+              <a:buNone/>
+            </a:pPr>
+            <a:r>
+              <a:rPr lang="en-CA" sz="1800" b="1" dirty="0">
+                <a:effectLst/>
+                <a:latin typeface="Arial" panose="020B0604020202020204" pitchFamily="34" charset="0"/>
+                <a:ea typeface="Calibri" panose="020F0502020204030204" pitchFamily="34" charset="0"/>
+              </a:rPr>
+              <a:t>Summary</a:t>
+            </a:r>
+          </a:p>
+          <a:p>
+            <a:pPr marL="0" indent="0">
+              <a:lnSpc>
+                <a:spcPct val="120000"/>
+              </a:lnSpc>
+              <a:spcBef>
+                <a:spcPts val="0"/>
+              </a:spcBef>
+              <a:spcAft>
+                <a:spcPts val="600"/>
+              </a:spcAft>
+              <a:buNone/>
+            </a:pPr>
+            <a:r>
+              <a:rPr lang="en-CA" sz="1800" dirty="0">
+                <a:effectLst/>
+                <a:latin typeface="Arial" panose="020B0604020202020204" pitchFamily="34" charset="0"/>
+                <a:ea typeface="Calibri" panose="020F0502020204030204" pitchFamily="34" charset="0"/>
+              </a:rPr>
+              <a:t>In this 4-hour workshop, students will learn basic data processing skills using Python. Attendees will learn how to import code from other modules and packages to take advantage of the existing Python ecosystem. After seeing how to access packages, we will explore popular data analysis packages. We will see how to use NumPy to perform operations on large data arrays and how to use Matplotlib to generate clear data visualisations. Finally, we will discuss how to approach a new, unfamiliar package and learn how to use it.</a:t>
+            </a:r>
+            <a:endParaRPr lang="en-CA" sz="1800" dirty="0">
+              <a:effectLst/>
+              <a:latin typeface="Arial" panose="020B0604020202020204" pitchFamily="34" charset="0"/>
+              <a:ea typeface="Arial" panose="020B0604020202020204" pitchFamily="34" charset="0"/>
+            </a:endParaRPr>
+          </a:p>
+          <a:p>
+            <a:pPr marL="0" indent="0">
+              <a:lnSpc>
+                <a:spcPct val="120000"/>
+              </a:lnSpc>
+              <a:spcBef>
+                <a:spcPts val="0"/>
+              </a:spcBef>
+              <a:spcAft>
+                <a:spcPts val="600"/>
+              </a:spcAft>
+              <a:buNone/>
+            </a:pPr>
+            <a:endParaRPr lang="en-CA" sz="1800" b="1" dirty="0">
+              <a:effectLst/>
+              <a:latin typeface="Arial" panose="020B0604020202020204" pitchFamily="34" charset="0"/>
+              <a:ea typeface="Calibri" panose="020F0502020204030204" pitchFamily="34" charset="0"/>
+            </a:endParaRPr>
+          </a:p>
+          <a:p>
+            <a:pPr marL="0" indent="0">
+              <a:lnSpc>
+                <a:spcPct val="120000"/>
+              </a:lnSpc>
+              <a:spcBef>
+                <a:spcPts val="0"/>
+              </a:spcBef>
+              <a:spcAft>
+                <a:spcPts val="600"/>
+              </a:spcAft>
+              <a:buNone/>
+            </a:pPr>
+            <a:r>
+              <a:rPr lang="en-CA" sz="1800" b="1" dirty="0">
+                <a:effectLst/>
+                <a:latin typeface="Arial" panose="020B0604020202020204" pitchFamily="34" charset="0"/>
+                <a:ea typeface="Calibri" panose="020F0502020204030204" pitchFamily="34" charset="0"/>
+              </a:rPr>
+              <a:t>Learning Objectives</a:t>
+            </a:r>
+            <a:endParaRPr lang="en-CA" sz="1800" dirty="0">
+              <a:effectLst/>
+              <a:latin typeface="Arial" panose="020B0604020202020204" pitchFamily="34" charset="0"/>
+              <a:ea typeface="Arial" panose="020B0604020202020204" pitchFamily="34" charset="0"/>
+            </a:endParaRPr>
+          </a:p>
+          <a:p>
+            <a:pPr marL="342900" indent="-342900">
+              <a:lnSpc>
+                <a:spcPct val="120000"/>
+              </a:lnSpc>
+              <a:spcBef>
+                <a:spcPts val="0"/>
+              </a:spcBef>
+              <a:spcAft>
+                <a:spcPts val="600"/>
+              </a:spcAft>
+              <a:buFont typeface="+mj-lt"/>
+              <a:buAutoNum type="arabicPeriod"/>
+            </a:pPr>
+            <a:r>
+              <a:rPr lang="en-CA" sz="1800" dirty="0">
+                <a:effectLst/>
+                <a:latin typeface="Arial" panose="020B0604020202020204" pitchFamily="34" charset="0"/>
+                <a:ea typeface="Arial" panose="020B0604020202020204" pitchFamily="34" charset="0"/>
+              </a:rPr>
+              <a:t>Import code from existing modules and packages.</a:t>
+            </a:r>
+          </a:p>
+          <a:p>
+            <a:pPr marL="342900" indent="-342900">
+              <a:lnSpc>
+                <a:spcPct val="120000"/>
+              </a:lnSpc>
+              <a:spcBef>
+                <a:spcPts val="0"/>
+              </a:spcBef>
+              <a:spcAft>
+                <a:spcPts val="600"/>
+              </a:spcAft>
+              <a:buFont typeface="+mj-lt"/>
+              <a:buAutoNum type="arabicPeriod"/>
+            </a:pPr>
+            <a:r>
+              <a:rPr lang="en-CA" sz="1800" dirty="0">
+                <a:effectLst/>
+                <a:latin typeface="Arial" panose="020B0604020202020204" pitchFamily="34" charset="0"/>
+                <a:ea typeface="Calibri" panose="020F0502020204030204" pitchFamily="34" charset="0"/>
+              </a:rPr>
+              <a:t>Use NumPy to easily process multidimensional data.</a:t>
+            </a:r>
+            <a:endParaRPr lang="en-CA" sz="1800" dirty="0">
+              <a:effectLst/>
+              <a:latin typeface="Arial" panose="020B0604020202020204" pitchFamily="34" charset="0"/>
+              <a:ea typeface="Arial" panose="020B0604020202020204" pitchFamily="34" charset="0"/>
+            </a:endParaRPr>
+          </a:p>
+          <a:p>
+            <a:pPr marL="342900" indent="-342900">
+              <a:lnSpc>
+                <a:spcPct val="120000"/>
+              </a:lnSpc>
+              <a:spcBef>
+                <a:spcPts val="0"/>
+              </a:spcBef>
+              <a:spcAft>
+                <a:spcPts val="600"/>
+              </a:spcAft>
+              <a:buFont typeface="+mj-lt"/>
+              <a:buAutoNum type="arabicPeriod"/>
+            </a:pPr>
+            <a:r>
+              <a:rPr lang="en-CA" sz="1800" dirty="0">
+                <a:effectLst/>
+                <a:latin typeface="Arial" panose="020B0604020202020204" pitchFamily="34" charset="0"/>
+                <a:ea typeface="Calibri" panose="020F0502020204030204" pitchFamily="34" charset="0"/>
+              </a:rPr>
+              <a:t>Use Matplotlib to generate different types of plots to visualise data.</a:t>
+            </a:r>
+            <a:endParaRPr lang="en-CA" sz="1800" dirty="0">
+              <a:effectLst/>
+              <a:latin typeface="Arial" panose="020B0604020202020204" pitchFamily="34" charset="0"/>
+              <a:ea typeface="Arial" panose="020B0604020202020204" pitchFamily="34" charset="0"/>
+            </a:endParaRPr>
+          </a:p>
+          <a:p>
+            <a:pPr marL="342900" indent="-342900">
+              <a:lnSpc>
+                <a:spcPct val="120000"/>
+              </a:lnSpc>
+              <a:spcBef>
+                <a:spcPts val="0"/>
+              </a:spcBef>
+              <a:spcAft>
+                <a:spcPts val="600"/>
+              </a:spcAft>
+              <a:buFont typeface="+mj-lt"/>
+              <a:buAutoNum type="arabicPeriod"/>
+            </a:pPr>
+            <a:r>
+              <a:rPr lang="en-CA" sz="1800" dirty="0">
+                <a:effectLst/>
+                <a:latin typeface="Arial" panose="020B0604020202020204" pitchFamily="34" charset="0"/>
+                <a:ea typeface="Calibri" panose="020F0502020204030204" pitchFamily="34" charset="0"/>
+              </a:rPr>
+              <a:t>Approach a new package and explore its documentation and examples.</a:t>
+            </a:r>
+            <a:endParaRPr lang="en-CA" sz="1800" dirty="0">
+              <a:effectLst/>
+              <a:latin typeface="Arial" panose="020B0604020202020204" pitchFamily="34" charset="0"/>
+              <a:ea typeface="Arial" panose="020B0604020202020204" pitchFamily="34" charset="0"/>
+            </a:endParaRPr>
+          </a:p>
+        </p:txBody>
+      </p:sp>
+    </p:spTree>
+    <p:extLst>
+      <p:ext uri="{BB962C8B-B14F-4D97-AF65-F5344CB8AC3E}">
+        <p14:creationId xmlns:p14="http://schemas.microsoft.com/office/powerpoint/2010/main" val="2440716118"/>
+      </p:ext>
+    </p:extLst>
+  </p:cSld>
+  <p:clrMapOvr>
+    <a:masterClrMapping/>
+  </p:clrMapOvr>
+</p:sld>
+</file>
+
+<file path=ppt/slides/slide5.xml><?xml version="1.0" encoding="utf-8"?>
 <p:sld xmlns:a="http://schemas.openxmlformats.org/drawingml/2006/main" xmlns:r="http://schemas.openxmlformats.org/officeDocument/2006/relationships" xmlns:p="http://schemas.openxmlformats.org/presentationml/2006/main">
   <p:cSld>
     <p:spTree>
@@ -13828,7 +15045,7 @@
 </p:sld>
 </file>
 
-<file path=ppt/slides/slide5.xml><?xml version="1.0" encoding="utf-8"?>
+<file path=ppt/slides/slide6.xml><?xml version="1.0" encoding="utf-8"?>
 <p:sld xmlns:a="http://schemas.openxmlformats.org/drawingml/2006/main" xmlns:r="http://schemas.openxmlformats.org/officeDocument/2006/relationships" xmlns:p="http://schemas.openxmlformats.org/presentationml/2006/main">
   <p:cSld>
     <p:spTree>
@@ -14717,7 +15934,7 @@
 </p:sld>
 </file>
 
-<file path=ppt/slides/slide6.xml><?xml version="1.0" encoding="utf-8"?>
+<file path=ppt/slides/slide7.xml><?xml version="1.0" encoding="utf-8"?>
 <p:sld xmlns:a="http://schemas.openxmlformats.org/drawingml/2006/main" xmlns:r="http://schemas.openxmlformats.org/officeDocument/2006/relationships" xmlns:p="http://schemas.openxmlformats.org/presentationml/2006/main">
   <p:cSld>
     <p:spTree>
@@ -14923,7 +16140,7 @@
 </p:sld>
 </file>
 
-<file path=ppt/slides/slide7.xml><?xml version="1.0" encoding="utf-8"?>
+<file path=ppt/slides/slide8.xml><?xml version="1.0" encoding="utf-8"?>
 <p:sld xmlns:a="http://schemas.openxmlformats.org/drawingml/2006/main" xmlns:r="http://schemas.openxmlformats.org/officeDocument/2006/relationships" xmlns:p="http://schemas.openxmlformats.org/presentationml/2006/main">
   <p:cSld>
     <p:spTree>
@@ -15028,7 +16245,7 @@
 </p:sld>
 </file>
 
-<file path=ppt/slides/slide8.xml><?xml version="1.0" encoding="utf-8"?>
+<file path=ppt/slides/slide9.xml><?xml version="1.0" encoding="utf-8"?>
 <p:sld xmlns:a="http://schemas.openxmlformats.org/drawingml/2006/main" xmlns:r="http://schemas.openxmlformats.org/officeDocument/2006/relationships" xmlns:p="http://schemas.openxmlformats.org/presentationml/2006/main">
   <p:cSld>
     <p:spTree>
@@ -15875,925 +17092,6 @@
   <p:clrMapOvr>
     <a:masterClrMapping/>
   </p:clrMapOvr>
-</p:sld>
-</file>
-
-<file path=ppt/slides/slide9.xml><?xml version="1.0" encoding="utf-8"?>
-<p:sld xmlns:a="http://schemas.openxmlformats.org/drawingml/2006/main" xmlns:r="http://schemas.openxmlformats.org/officeDocument/2006/relationships" xmlns:p="http://schemas.openxmlformats.org/presentationml/2006/main">
-  <p:cSld>
-    <p:spTree>
-      <p:nvGrpSpPr>
-        <p:cNvPr id="1" name=""/>
-        <p:cNvGrpSpPr/>
-        <p:nvPr/>
-      </p:nvGrpSpPr>
-      <p:grpSpPr>
-        <a:xfrm>
-          <a:off x="0" y="0"/>
-          <a:ext cx="0" cy="0"/>
-          <a:chOff x="0" y="0"/>
-          <a:chExt cx="0" cy="0"/>
-        </a:xfrm>
-      </p:grpSpPr>
-      <p:graphicFrame>
-        <p:nvGraphicFramePr>
-          <p:cNvPr id="3" name="Table 2">
-            <a:extLst>
-              <a:ext uri="{FF2B5EF4-FFF2-40B4-BE49-F238E27FC236}">
-                <a16:creationId xmlns:a16="http://schemas.microsoft.com/office/drawing/2014/main" id="{FC9A80B6-5D2E-8104-3EFE-2662610E7846}"/>
-              </a:ext>
-            </a:extLst>
-          </p:cNvPr>
-          <p:cNvGraphicFramePr>
-            <a:graphicFrameLocks noGrp="1"/>
-          </p:cNvGraphicFramePr>
-          <p:nvPr/>
-        </p:nvGraphicFramePr>
-        <p:xfrm>
-          <a:off x="389482" y="679622"/>
-          <a:ext cx="8365038" cy="5289375"/>
-        </p:xfrm>
-        <a:graphic>
-          <a:graphicData uri="http://schemas.openxmlformats.org/drawingml/2006/table">
-            <a:tbl>
-              <a:tblPr bandRow="1">
-                <a:tableStyleId>{9D7B26C5-4107-4FEC-AEDC-1716B250A1EF}</a:tableStyleId>
-              </a:tblPr>
-              <a:tblGrid>
-                <a:gridCol w="1394173">
-                  <a:extLst>
-                    <a:ext uri="{9D8B030D-6E8A-4147-A177-3AD203B41FA5}">
-                      <a16:colId xmlns:a16="http://schemas.microsoft.com/office/drawing/2014/main" val="501879301"/>
-                    </a:ext>
-                  </a:extLst>
-                </a:gridCol>
-                <a:gridCol w="1394173">
-                  <a:extLst>
-                    <a:ext uri="{9D8B030D-6E8A-4147-A177-3AD203B41FA5}">
-                      <a16:colId xmlns:a16="http://schemas.microsoft.com/office/drawing/2014/main" val="1303827765"/>
-                    </a:ext>
-                  </a:extLst>
-                </a:gridCol>
-                <a:gridCol w="1394173">
-                  <a:extLst>
-                    <a:ext uri="{9D8B030D-6E8A-4147-A177-3AD203B41FA5}">
-                      <a16:colId xmlns:a16="http://schemas.microsoft.com/office/drawing/2014/main" val="2642395476"/>
-                    </a:ext>
-                  </a:extLst>
-                </a:gridCol>
-                <a:gridCol w="1394173">
-                  <a:extLst>
-                    <a:ext uri="{9D8B030D-6E8A-4147-A177-3AD203B41FA5}">
-                      <a16:colId xmlns:a16="http://schemas.microsoft.com/office/drawing/2014/main" val="31023376"/>
-                    </a:ext>
-                  </a:extLst>
-                </a:gridCol>
-                <a:gridCol w="1394173">
-                  <a:extLst>
-                    <a:ext uri="{9D8B030D-6E8A-4147-A177-3AD203B41FA5}">
-                      <a16:colId xmlns:a16="http://schemas.microsoft.com/office/drawing/2014/main" val="1036227730"/>
-                    </a:ext>
-                  </a:extLst>
-                </a:gridCol>
-                <a:gridCol w="1394173">
-                  <a:extLst>
-                    <a:ext uri="{9D8B030D-6E8A-4147-A177-3AD203B41FA5}">
-                      <a16:colId xmlns:a16="http://schemas.microsoft.com/office/drawing/2014/main" val="1909034482"/>
-                    </a:ext>
-                  </a:extLst>
-                </a:gridCol>
-              </a:tblGrid>
-              <a:tr h="1057875">
-                <a:tc>
-                  <a:txBody>
-                    <a:bodyPr/>
-                    <a:lstStyle/>
-                    <a:p>
-                      <a:pPr algn="ctr"/>
-                      <a:r>
-                        <a:rPr lang="en-CA" sz="2500" b="1" dirty="0">
-                          <a:solidFill>
-                            <a:schemeClr val="tx1"/>
-                          </a:solidFill>
-                        </a:rPr>
-                        <a:t>(0, 0)</a:t>
-                      </a:r>
-                    </a:p>
-                  </a:txBody>
-                  <a:tcPr marL="125476" marR="125476" marT="62738" marB="62738" anchor="ctr">
-                    <a:lnL w="28575" cap="flat" cmpd="sng" algn="ctr">
-                      <a:solidFill>
-                        <a:schemeClr val="tx1"/>
-                      </a:solidFill>
-                      <a:prstDash val="solid"/>
-                      <a:round/>
-                      <a:headEnd type="none" w="med" len="med"/>
-                      <a:tailEnd type="none" w="med" len="med"/>
-                    </a:lnL>
-                    <a:lnT w="28575" cap="flat" cmpd="sng" algn="ctr">
-                      <a:solidFill>
-                        <a:schemeClr val="tx1"/>
-                      </a:solidFill>
-                      <a:prstDash val="solid"/>
-                      <a:round/>
-                      <a:headEnd type="none" w="med" len="med"/>
-                      <a:tailEnd type="none" w="med" len="med"/>
-                    </a:lnT>
-                    <a:solidFill>
-                      <a:schemeClr val="tx1">
-                        <a:alpha val="19778"/>
-                      </a:schemeClr>
-                    </a:solidFill>
-                  </a:tcPr>
-                </a:tc>
-                <a:tc>
-                  <a:txBody>
-                    <a:bodyPr/>
-                    <a:lstStyle/>
-                    <a:p>
-                      <a:pPr algn="ctr"/>
-                      <a:r>
-                        <a:rPr lang="en-CA" sz="2500" b="1" dirty="0">
-                          <a:solidFill>
-                            <a:schemeClr val="tx1"/>
-                          </a:solidFill>
-                        </a:rPr>
-                        <a:t>(0, 1)</a:t>
-                      </a:r>
-                    </a:p>
-                  </a:txBody>
-                  <a:tcPr marL="125476" marR="125476" marT="62738" marB="62738" anchor="ctr">
-                    <a:lnT w="28575" cap="flat" cmpd="sng" algn="ctr">
-                      <a:solidFill>
-                        <a:schemeClr val="tx1"/>
-                      </a:solidFill>
-                      <a:prstDash val="solid"/>
-                      <a:round/>
-                      <a:headEnd type="none" w="med" len="med"/>
-                      <a:tailEnd type="none" w="med" len="med"/>
-                    </a:lnT>
-                    <a:solidFill>
-                      <a:schemeClr val="tx1">
-                        <a:alpha val="19778"/>
-                      </a:schemeClr>
-                    </a:solidFill>
-                  </a:tcPr>
-                </a:tc>
-                <a:tc>
-                  <a:txBody>
-                    <a:bodyPr/>
-                    <a:lstStyle/>
-                    <a:p>
-                      <a:pPr algn="ctr"/>
-                      <a:r>
-                        <a:rPr lang="en-CA" sz="2500" b="1" dirty="0">
-                          <a:solidFill>
-                            <a:schemeClr val="tx1"/>
-                          </a:solidFill>
-                        </a:rPr>
-                        <a:t>(0, 2)</a:t>
-                      </a:r>
-                    </a:p>
-                  </a:txBody>
-                  <a:tcPr marL="125476" marR="125476" marT="62738" marB="62738" anchor="ctr">
-                    <a:lnT w="28575" cap="flat" cmpd="sng" algn="ctr">
-                      <a:solidFill>
-                        <a:schemeClr val="tx1"/>
-                      </a:solidFill>
-                      <a:prstDash val="solid"/>
-                      <a:round/>
-                      <a:headEnd type="none" w="med" len="med"/>
-                      <a:tailEnd type="none" w="med" len="med"/>
-                    </a:lnT>
-                    <a:solidFill>
-                      <a:schemeClr val="tx1">
-                        <a:alpha val="19778"/>
-                      </a:schemeClr>
-                    </a:solidFill>
-                  </a:tcPr>
-                </a:tc>
-                <a:tc>
-                  <a:txBody>
-                    <a:bodyPr/>
-                    <a:lstStyle/>
-                    <a:p>
-                      <a:pPr algn="ctr"/>
-                      <a:r>
-                        <a:rPr lang="en-CA" sz="2500" b="1" dirty="0">
-                          <a:solidFill>
-                            <a:schemeClr val="tx1"/>
-                          </a:solidFill>
-                        </a:rPr>
-                        <a:t>(0, 3)</a:t>
-                      </a:r>
-                    </a:p>
-                  </a:txBody>
-                  <a:tcPr marL="125476" marR="125476" marT="62738" marB="62738" anchor="ctr">
-                    <a:lnT w="28575" cap="flat" cmpd="sng" algn="ctr">
-                      <a:solidFill>
-                        <a:schemeClr val="tx1"/>
-                      </a:solidFill>
-                      <a:prstDash val="solid"/>
-                      <a:round/>
-                      <a:headEnd type="none" w="med" len="med"/>
-                      <a:tailEnd type="none" w="med" len="med"/>
-                    </a:lnT>
-                    <a:solidFill>
-                      <a:schemeClr val="tx1">
-                        <a:alpha val="19778"/>
-                      </a:schemeClr>
-                    </a:solidFill>
-                  </a:tcPr>
-                </a:tc>
-                <a:tc>
-                  <a:txBody>
-                    <a:bodyPr/>
-                    <a:lstStyle/>
-                    <a:p>
-                      <a:pPr algn="ctr"/>
-                      <a:r>
-                        <a:rPr lang="en-CA" sz="2500" b="1" dirty="0">
-                          <a:solidFill>
-                            <a:schemeClr val="tx1"/>
-                          </a:solidFill>
-                        </a:rPr>
-                        <a:t>(0, 4)</a:t>
-                      </a:r>
-                    </a:p>
-                  </a:txBody>
-                  <a:tcPr marL="125476" marR="125476" marT="62738" marB="62738" anchor="ctr">
-                    <a:lnT w="28575" cap="flat" cmpd="sng" algn="ctr">
-                      <a:solidFill>
-                        <a:schemeClr val="tx1"/>
-                      </a:solidFill>
-                      <a:prstDash val="solid"/>
-                      <a:round/>
-                      <a:headEnd type="none" w="med" len="med"/>
-                      <a:tailEnd type="none" w="med" len="med"/>
-                    </a:lnT>
-                    <a:solidFill>
-                      <a:schemeClr val="tx1">
-                        <a:alpha val="19778"/>
-                      </a:schemeClr>
-                    </a:solidFill>
-                  </a:tcPr>
-                </a:tc>
-                <a:tc>
-                  <a:txBody>
-                    <a:bodyPr/>
-                    <a:lstStyle/>
-                    <a:p>
-                      <a:pPr algn="ctr"/>
-                      <a:r>
-                        <a:rPr lang="en-CA" sz="2500" b="1" dirty="0">
-                          <a:solidFill>
-                            <a:schemeClr val="tx1"/>
-                          </a:solidFill>
-                        </a:rPr>
-                        <a:t>(0, 5)</a:t>
-                      </a:r>
-                    </a:p>
-                  </a:txBody>
-                  <a:tcPr marL="125476" marR="125476" marT="62738" marB="62738" anchor="ctr">
-                    <a:lnR w="28575" cap="flat" cmpd="sng" algn="ctr">
-                      <a:solidFill>
-                        <a:schemeClr val="tx1"/>
-                      </a:solidFill>
-                      <a:prstDash val="solid"/>
-                      <a:round/>
-                      <a:headEnd type="none" w="med" len="med"/>
-                      <a:tailEnd type="none" w="med" len="med"/>
-                    </a:lnR>
-                    <a:lnT w="28575" cap="flat" cmpd="sng" algn="ctr">
-                      <a:solidFill>
-                        <a:schemeClr val="tx1"/>
-                      </a:solidFill>
-                      <a:prstDash val="solid"/>
-                      <a:round/>
-                      <a:headEnd type="none" w="med" len="med"/>
-                      <a:tailEnd type="none" w="med" len="med"/>
-                    </a:lnT>
-                    <a:solidFill>
-                      <a:schemeClr val="tx1">
-                        <a:alpha val="19778"/>
-                      </a:schemeClr>
-                    </a:solidFill>
-                  </a:tcPr>
-                </a:tc>
-                <a:extLst>
-                  <a:ext uri="{0D108BD9-81ED-4DB2-BD59-A6C34878D82A}">
-                    <a16:rowId xmlns:a16="http://schemas.microsoft.com/office/drawing/2014/main" val="4174509116"/>
-                  </a:ext>
-                </a:extLst>
-              </a:tr>
-              <a:tr h="1057875">
-                <a:tc>
-                  <a:txBody>
-                    <a:bodyPr/>
-                    <a:lstStyle/>
-                    <a:p>
-                      <a:pPr algn="ctr"/>
-                      <a:r>
-                        <a:rPr lang="en-CA" sz="2500" b="1" dirty="0"/>
-                        <a:t>(1, 0)</a:t>
-                      </a:r>
-                    </a:p>
-                  </a:txBody>
-                  <a:tcPr marL="125476" marR="125476" marT="62738" marB="62738" anchor="ctr">
-                    <a:lnL w="28575" cap="flat" cmpd="sng" algn="ctr">
-                      <a:solidFill>
-                        <a:schemeClr val="tx1"/>
-                      </a:solidFill>
-                      <a:prstDash val="solid"/>
-                      <a:round/>
-                      <a:headEnd type="none" w="med" len="med"/>
-                      <a:tailEnd type="none" w="med" len="med"/>
-                    </a:lnL>
-                  </a:tcPr>
-                </a:tc>
-                <a:tc>
-                  <a:txBody>
-                    <a:bodyPr/>
-                    <a:lstStyle/>
-                    <a:p>
-                      <a:pPr algn="ctr"/>
-                      <a:r>
-                        <a:rPr lang="en-CA" sz="2500" b="1" dirty="0"/>
-                        <a:t>(1, 1)</a:t>
-                      </a:r>
-                    </a:p>
-                  </a:txBody>
-                  <a:tcPr marL="125476" marR="125476" marT="62738" marB="62738" anchor="ctr"/>
-                </a:tc>
-                <a:tc>
-                  <a:txBody>
-                    <a:bodyPr/>
-                    <a:lstStyle/>
-                    <a:p>
-                      <a:pPr algn="ctr"/>
-                      <a:r>
-                        <a:rPr lang="en-CA" sz="2500" b="1" dirty="0"/>
-                        <a:t>(1, 2)</a:t>
-                      </a:r>
-                    </a:p>
-                  </a:txBody>
-                  <a:tcPr marL="125476" marR="125476" marT="62738" marB="62738" anchor="ctr"/>
-                </a:tc>
-                <a:tc>
-                  <a:txBody>
-                    <a:bodyPr/>
-                    <a:lstStyle/>
-                    <a:p>
-                      <a:pPr algn="ctr"/>
-                      <a:r>
-                        <a:rPr lang="en-CA" sz="2500" b="1" dirty="0"/>
-                        <a:t>(1, 3)</a:t>
-                      </a:r>
-                    </a:p>
-                  </a:txBody>
-                  <a:tcPr marL="125476" marR="125476" marT="62738" marB="62738" anchor="ctr"/>
-                </a:tc>
-                <a:tc>
-                  <a:txBody>
-                    <a:bodyPr/>
-                    <a:lstStyle/>
-                    <a:p>
-                      <a:pPr algn="ctr"/>
-                      <a:r>
-                        <a:rPr lang="en-CA" sz="2500" b="1" dirty="0"/>
-                        <a:t>(1, 4)</a:t>
-                      </a:r>
-                    </a:p>
-                  </a:txBody>
-                  <a:tcPr marL="125476" marR="125476" marT="62738" marB="62738" anchor="ctr"/>
-                </a:tc>
-                <a:tc>
-                  <a:txBody>
-                    <a:bodyPr/>
-                    <a:lstStyle/>
-                    <a:p>
-                      <a:pPr algn="ctr"/>
-                      <a:r>
-                        <a:rPr lang="en-CA" sz="2500" b="1" dirty="0"/>
-                        <a:t>(1, 5)</a:t>
-                      </a:r>
-                    </a:p>
-                  </a:txBody>
-                  <a:tcPr marL="125476" marR="125476" marT="62738" marB="62738" anchor="ctr">
-                    <a:lnR w="28575" cap="flat" cmpd="sng" algn="ctr">
-                      <a:solidFill>
-                        <a:schemeClr val="tx1"/>
-                      </a:solidFill>
-                      <a:prstDash val="solid"/>
-                      <a:round/>
-                      <a:headEnd type="none" w="med" len="med"/>
-                      <a:tailEnd type="none" w="med" len="med"/>
-                    </a:lnR>
-                  </a:tcPr>
-                </a:tc>
-                <a:extLst>
-                  <a:ext uri="{0D108BD9-81ED-4DB2-BD59-A6C34878D82A}">
-                    <a16:rowId xmlns:a16="http://schemas.microsoft.com/office/drawing/2014/main" val="869178520"/>
-                  </a:ext>
-                </a:extLst>
-              </a:tr>
-              <a:tr h="1057875">
-                <a:tc>
-                  <a:txBody>
-                    <a:bodyPr/>
-                    <a:lstStyle/>
-                    <a:p>
-                      <a:pPr algn="ctr"/>
-                      <a:r>
-                        <a:rPr lang="en-CA" sz="2500" b="1" dirty="0"/>
-                        <a:t>(2, 0)</a:t>
-                      </a:r>
-                    </a:p>
-                  </a:txBody>
-                  <a:tcPr marL="125476" marR="125476" marT="62738" marB="62738" anchor="ctr">
-                    <a:lnL w="28575" cap="flat" cmpd="sng" algn="ctr">
-                      <a:solidFill>
-                        <a:schemeClr val="tx1"/>
-                      </a:solidFill>
-                      <a:prstDash val="solid"/>
-                      <a:round/>
-                      <a:headEnd type="none" w="med" len="med"/>
-                      <a:tailEnd type="none" w="med" len="med"/>
-                    </a:lnL>
-                  </a:tcPr>
-                </a:tc>
-                <a:tc>
-                  <a:txBody>
-                    <a:bodyPr/>
-                    <a:lstStyle/>
-                    <a:p>
-                      <a:pPr algn="ctr"/>
-                      <a:r>
-                        <a:rPr lang="en-CA" sz="2500" b="1" dirty="0"/>
-                        <a:t>(2, 1)</a:t>
-                      </a:r>
-                    </a:p>
-                  </a:txBody>
-                  <a:tcPr marL="125476" marR="125476" marT="62738" marB="62738" anchor="ctr"/>
-                </a:tc>
-                <a:tc>
-                  <a:txBody>
-                    <a:bodyPr/>
-                    <a:lstStyle/>
-                    <a:p>
-                      <a:pPr algn="ctr"/>
-                      <a:r>
-                        <a:rPr lang="en-CA" sz="2500" b="1" dirty="0"/>
-                        <a:t>(2, 2)</a:t>
-                      </a:r>
-                    </a:p>
-                  </a:txBody>
-                  <a:tcPr marL="125476" marR="125476" marT="62738" marB="62738" anchor="ctr"/>
-                </a:tc>
-                <a:tc>
-                  <a:txBody>
-                    <a:bodyPr/>
-                    <a:lstStyle/>
-                    <a:p>
-                      <a:pPr algn="ctr"/>
-                      <a:r>
-                        <a:rPr lang="en-CA" sz="2500" b="1" dirty="0"/>
-                        <a:t>(2, 3)</a:t>
-                      </a:r>
-                    </a:p>
-                  </a:txBody>
-                  <a:tcPr marL="125476" marR="125476" marT="62738" marB="62738" anchor="ctr"/>
-                </a:tc>
-                <a:tc>
-                  <a:txBody>
-                    <a:bodyPr/>
-                    <a:lstStyle/>
-                    <a:p>
-                      <a:pPr algn="ctr"/>
-                      <a:r>
-                        <a:rPr lang="en-CA" sz="2500" b="1" dirty="0"/>
-                        <a:t>(2, 4)</a:t>
-                      </a:r>
-                    </a:p>
-                  </a:txBody>
-                  <a:tcPr marL="125476" marR="125476" marT="62738" marB="62738" anchor="ctr"/>
-                </a:tc>
-                <a:tc>
-                  <a:txBody>
-                    <a:bodyPr/>
-                    <a:lstStyle/>
-                    <a:p>
-                      <a:pPr algn="ctr"/>
-                      <a:r>
-                        <a:rPr lang="en-CA" sz="2500" b="1" dirty="0"/>
-                        <a:t>(2, 5)</a:t>
-                      </a:r>
-                    </a:p>
-                  </a:txBody>
-                  <a:tcPr marL="125476" marR="125476" marT="62738" marB="62738" anchor="ctr">
-                    <a:lnR w="28575" cap="flat" cmpd="sng" algn="ctr">
-                      <a:solidFill>
-                        <a:schemeClr val="tx1"/>
-                      </a:solidFill>
-                      <a:prstDash val="solid"/>
-                      <a:round/>
-                      <a:headEnd type="none" w="med" len="med"/>
-                      <a:tailEnd type="none" w="med" len="med"/>
-                    </a:lnR>
-                  </a:tcPr>
-                </a:tc>
-                <a:extLst>
-                  <a:ext uri="{0D108BD9-81ED-4DB2-BD59-A6C34878D82A}">
-                    <a16:rowId xmlns:a16="http://schemas.microsoft.com/office/drawing/2014/main" val="1972965025"/>
-                  </a:ext>
-                </a:extLst>
-              </a:tr>
-              <a:tr h="1057875">
-                <a:tc>
-                  <a:txBody>
-                    <a:bodyPr/>
-                    <a:lstStyle/>
-                    <a:p>
-                      <a:pPr algn="ctr"/>
-                      <a:r>
-                        <a:rPr lang="en-CA" sz="2500" b="1" dirty="0"/>
-                        <a:t>(3, 0)</a:t>
-                      </a:r>
-                    </a:p>
-                  </a:txBody>
-                  <a:tcPr marL="125476" marR="125476" marT="62738" marB="62738" anchor="ctr">
-                    <a:lnL w="28575" cap="flat" cmpd="sng" algn="ctr">
-                      <a:solidFill>
-                        <a:schemeClr val="tx1"/>
-                      </a:solidFill>
-                      <a:prstDash val="solid"/>
-                      <a:round/>
-                      <a:headEnd type="none" w="med" len="med"/>
-                      <a:tailEnd type="none" w="med" len="med"/>
-                    </a:lnL>
-                  </a:tcPr>
-                </a:tc>
-                <a:tc>
-                  <a:txBody>
-                    <a:bodyPr/>
-                    <a:lstStyle/>
-                    <a:p>
-                      <a:pPr algn="ctr"/>
-                      <a:r>
-                        <a:rPr lang="en-CA" sz="2500" b="1" dirty="0"/>
-                        <a:t>(3, 1)</a:t>
-                      </a:r>
-                    </a:p>
-                  </a:txBody>
-                  <a:tcPr marL="125476" marR="125476" marT="62738" marB="62738" anchor="ctr"/>
-                </a:tc>
-                <a:tc>
-                  <a:txBody>
-                    <a:bodyPr/>
-                    <a:lstStyle/>
-                    <a:p>
-                      <a:pPr algn="ctr"/>
-                      <a:r>
-                        <a:rPr lang="en-CA" sz="2500" b="1" dirty="0"/>
-                        <a:t>(3, 2)</a:t>
-                      </a:r>
-                    </a:p>
-                  </a:txBody>
-                  <a:tcPr marL="125476" marR="125476" marT="62738" marB="62738" anchor="ctr"/>
-                </a:tc>
-                <a:tc>
-                  <a:txBody>
-                    <a:bodyPr/>
-                    <a:lstStyle/>
-                    <a:p>
-                      <a:pPr algn="ctr"/>
-                      <a:r>
-                        <a:rPr lang="en-CA" sz="2500" b="1" dirty="0"/>
-                        <a:t>(3, 3)</a:t>
-                      </a:r>
-                    </a:p>
-                  </a:txBody>
-                  <a:tcPr marL="125476" marR="125476" marT="62738" marB="62738" anchor="ctr"/>
-                </a:tc>
-                <a:tc>
-                  <a:txBody>
-                    <a:bodyPr/>
-                    <a:lstStyle/>
-                    <a:p>
-                      <a:pPr algn="ctr"/>
-                      <a:r>
-                        <a:rPr lang="en-CA" sz="2500" b="1" dirty="0"/>
-                        <a:t>(3, 4)</a:t>
-                      </a:r>
-                    </a:p>
-                  </a:txBody>
-                  <a:tcPr marL="125476" marR="125476" marT="62738" marB="62738" anchor="ctr"/>
-                </a:tc>
-                <a:tc>
-                  <a:txBody>
-                    <a:bodyPr/>
-                    <a:lstStyle/>
-                    <a:p>
-                      <a:pPr algn="ctr"/>
-                      <a:r>
-                        <a:rPr lang="en-CA" sz="2500" b="1" dirty="0"/>
-                        <a:t>(3, 5)</a:t>
-                      </a:r>
-                    </a:p>
-                  </a:txBody>
-                  <a:tcPr marL="125476" marR="125476" marT="62738" marB="62738" anchor="ctr">
-                    <a:lnR w="28575" cap="flat" cmpd="sng" algn="ctr">
-                      <a:solidFill>
-                        <a:schemeClr val="tx1"/>
-                      </a:solidFill>
-                      <a:prstDash val="solid"/>
-                      <a:round/>
-                      <a:headEnd type="none" w="med" len="med"/>
-                      <a:tailEnd type="none" w="med" len="med"/>
-                    </a:lnR>
-                  </a:tcPr>
-                </a:tc>
-                <a:extLst>
-                  <a:ext uri="{0D108BD9-81ED-4DB2-BD59-A6C34878D82A}">
-                    <a16:rowId xmlns:a16="http://schemas.microsoft.com/office/drawing/2014/main" val="578959827"/>
-                  </a:ext>
-                </a:extLst>
-              </a:tr>
-              <a:tr h="1057875">
-                <a:tc>
-                  <a:txBody>
-                    <a:bodyPr/>
-                    <a:lstStyle/>
-                    <a:p>
-                      <a:pPr algn="ctr"/>
-                      <a:r>
-                        <a:rPr lang="en-CA" sz="2500" b="1" dirty="0"/>
-                        <a:t>(4, 0)</a:t>
-                      </a:r>
-                    </a:p>
-                  </a:txBody>
-                  <a:tcPr marL="125476" marR="125476" marT="62738" marB="62738" anchor="ctr">
-                    <a:lnL w="28575" cap="flat" cmpd="sng" algn="ctr">
-                      <a:solidFill>
-                        <a:schemeClr val="tx1"/>
-                      </a:solidFill>
-                      <a:prstDash val="solid"/>
-                      <a:round/>
-                      <a:headEnd type="none" w="med" len="med"/>
-                      <a:tailEnd type="none" w="med" len="med"/>
-                    </a:lnL>
-                    <a:lnB w="28575" cap="flat" cmpd="sng" algn="ctr">
-                      <a:solidFill>
-                        <a:schemeClr val="tx1"/>
-                      </a:solidFill>
-                      <a:prstDash val="solid"/>
-                      <a:round/>
-                      <a:headEnd type="none" w="med" len="med"/>
-                      <a:tailEnd type="none" w="med" len="med"/>
-                    </a:lnB>
-                  </a:tcPr>
-                </a:tc>
-                <a:tc>
-                  <a:txBody>
-                    <a:bodyPr/>
-                    <a:lstStyle/>
-                    <a:p>
-                      <a:pPr algn="ctr"/>
-                      <a:r>
-                        <a:rPr lang="en-CA" sz="2500" b="1" dirty="0"/>
-                        <a:t>(4, 1)</a:t>
-                      </a:r>
-                    </a:p>
-                  </a:txBody>
-                  <a:tcPr marL="125476" marR="125476" marT="62738" marB="62738" anchor="ctr">
-                    <a:lnB w="28575" cap="flat" cmpd="sng" algn="ctr">
-                      <a:solidFill>
-                        <a:schemeClr val="tx1"/>
-                      </a:solidFill>
-                      <a:prstDash val="solid"/>
-                      <a:round/>
-                      <a:headEnd type="none" w="med" len="med"/>
-                      <a:tailEnd type="none" w="med" len="med"/>
-                    </a:lnB>
-                  </a:tcPr>
-                </a:tc>
-                <a:tc>
-                  <a:txBody>
-                    <a:bodyPr/>
-                    <a:lstStyle/>
-                    <a:p>
-                      <a:pPr algn="ctr"/>
-                      <a:r>
-                        <a:rPr lang="en-CA" sz="2500" b="1" dirty="0"/>
-                        <a:t>(4, 2)</a:t>
-                      </a:r>
-                    </a:p>
-                  </a:txBody>
-                  <a:tcPr marL="125476" marR="125476" marT="62738" marB="62738" anchor="ctr">
-                    <a:lnB w="28575" cap="flat" cmpd="sng" algn="ctr">
-                      <a:solidFill>
-                        <a:schemeClr val="tx1"/>
-                      </a:solidFill>
-                      <a:prstDash val="solid"/>
-                      <a:round/>
-                      <a:headEnd type="none" w="med" len="med"/>
-                      <a:tailEnd type="none" w="med" len="med"/>
-                    </a:lnB>
-                  </a:tcPr>
-                </a:tc>
-                <a:tc>
-                  <a:txBody>
-                    <a:bodyPr/>
-                    <a:lstStyle/>
-                    <a:p>
-                      <a:pPr algn="ctr"/>
-                      <a:r>
-                        <a:rPr lang="en-CA" sz="2500" b="1" dirty="0"/>
-                        <a:t>(4, 3)</a:t>
-                      </a:r>
-                    </a:p>
-                  </a:txBody>
-                  <a:tcPr marL="125476" marR="125476" marT="62738" marB="62738" anchor="ctr">
-                    <a:lnB w="28575" cap="flat" cmpd="sng" algn="ctr">
-                      <a:solidFill>
-                        <a:schemeClr val="tx1"/>
-                      </a:solidFill>
-                      <a:prstDash val="solid"/>
-                      <a:round/>
-                      <a:headEnd type="none" w="med" len="med"/>
-                      <a:tailEnd type="none" w="med" len="med"/>
-                    </a:lnB>
-                  </a:tcPr>
-                </a:tc>
-                <a:tc>
-                  <a:txBody>
-                    <a:bodyPr/>
-                    <a:lstStyle/>
-                    <a:p>
-                      <a:pPr algn="ctr"/>
-                      <a:r>
-                        <a:rPr lang="en-CA" sz="2500" b="1" dirty="0"/>
-                        <a:t>(4, 4)</a:t>
-                      </a:r>
-                    </a:p>
-                  </a:txBody>
-                  <a:tcPr marL="125476" marR="125476" marT="62738" marB="62738" anchor="ctr">
-                    <a:lnB w="28575" cap="flat" cmpd="sng" algn="ctr">
-                      <a:solidFill>
-                        <a:schemeClr val="tx1"/>
-                      </a:solidFill>
-                      <a:prstDash val="solid"/>
-                      <a:round/>
-                      <a:headEnd type="none" w="med" len="med"/>
-                      <a:tailEnd type="none" w="med" len="med"/>
-                    </a:lnB>
-                  </a:tcPr>
-                </a:tc>
-                <a:tc>
-                  <a:txBody>
-                    <a:bodyPr/>
-                    <a:lstStyle/>
-                    <a:p>
-                      <a:pPr algn="ctr"/>
-                      <a:r>
-                        <a:rPr lang="en-CA" sz="2500" b="1" dirty="0"/>
-                        <a:t>(4, 5)</a:t>
-                      </a:r>
-                    </a:p>
-                  </a:txBody>
-                  <a:tcPr marL="125476" marR="125476" marT="62738" marB="62738" anchor="ctr">
-                    <a:lnR w="28575" cap="flat" cmpd="sng" algn="ctr">
-                      <a:solidFill>
-                        <a:schemeClr val="tx1"/>
-                      </a:solidFill>
-                      <a:prstDash val="solid"/>
-                      <a:round/>
-                      <a:headEnd type="none" w="med" len="med"/>
-                      <a:tailEnd type="none" w="med" len="med"/>
-                    </a:lnR>
-                    <a:lnB w="28575" cap="flat" cmpd="sng" algn="ctr">
-                      <a:solidFill>
-                        <a:schemeClr val="tx1"/>
-                      </a:solidFill>
-                      <a:prstDash val="solid"/>
-                      <a:round/>
-                      <a:headEnd type="none" w="med" len="med"/>
-                      <a:tailEnd type="none" w="med" len="med"/>
-                    </a:lnB>
-                  </a:tcPr>
-                </a:tc>
-                <a:extLst>
-                  <a:ext uri="{0D108BD9-81ED-4DB2-BD59-A6C34878D82A}">
-                    <a16:rowId xmlns:a16="http://schemas.microsoft.com/office/drawing/2014/main" val="85115382"/>
-                  </a:ext>
-                </a:extLst>
-              </a:tr>
-            </a:tbl>
-          </a:graphicData>
-        </a:graphic>
-      </p:graphicFrame>
-      <p:sp>
-        <p:nvSpPr>
-          <p:cNvPr id="4" name="TextBox 3">
-            <a:extLst>
-              <a:ext uri="{FF2B5EF4-FFF2-40B4-BE49-F238E27FC236}">
-                <a16:creationId xmlns:a16="http://schemas.microsoft.com/office/drawing/2014/main" id="{388492A2-1F09-4B96-CC84-50CF5D7AD05E}"/>
-              </a:ext>
-            </a:extLst>
-          </p:cNvPr>
-          <p:cNvSpPr txBox="1"/>
-          <p:nvPr/>
-        </p:nvSpPr>
-        <p:spPr>
-          <a:xfrm>
-            <a:off x="3419280" y="6067168"/>
-            <a:ext cx="2305439" cy="584775"/>
-          </a:xfrm>
-          <a:prstGeom prst="rect">
-            <a:avLst/>
-          </a:prstGeom>
-          <a:noFill/>
-        </p:spPr>
-        <p:txBody>
-          <a:bodyPr wrap="none" rtlCol="0">
-            <a:spAutoFit/>
-          </a:bodyPr>
-          <a:lstStyle/>
-          <a:p>
-            <a:r>
-              <a:rPr lang="en-CA" sz="3200" b="1" dirty="0"/>
-              <a:t>Shape: (5, 6)</a:t>
-            </a:r>
-          </a:p>
-        </p:txBody>
-      </p:sp>
-      <p:sp>
-        <p:nvSpPr>
-          <p:cNvPr id="5" name="TextBox 4">
-            <a:extLst>
-              <a:ext uri="{FF2B5EF4-FFF2-40B4-BE49-F238E27FC236}">
-                <a16:creationId xmlns:a16="http://schemas.microsoft.com/office/drawing/2014/main" id="{D5252BC9-85EA-823B-57EC-C6FB43215009}"/>
-              </a:ext>
-            </a:extLst>
-          </p:cNvPr>
-          <p:cNvSpPr txBox="1"/>
-          <p:nvPr/>
-        </p:nvSpPr>
-        <p:spPr>
-          <a:xfrm>
-            <a:off x="494270" y="58231"/>
-            <a:ext cx="2762295" cy="523220"/>
-          </a:xfrm>
-          <a:prstGeom prst="rect">
-            <a:avLst/>
-          </a:prstGeom>
-          <a:noFill/>
-        </p:spPr>
-        <p:txBody>
-          <a:bodyPr wrap="none" rtlCol="0">
-            <a:spAutoFit/>
-          </a:bodyPr>
-          <a:lstStyle/>
-          <a:p>
-            <a:r>
-              <a:rPr lang="en-CA" sz="2800" b="1" dirty="0" err="1">
-                <a:latin typeface="Roboto Mono" pitchFamily="2" charset="0"/>
-                <a:ea typeface="Roboto Mono" pitchFamily="2" charset="0"/>
-              </a:rPr>
-              <a:t>my_array</a:t>
-            </a:r>
-            <a:r>
-              <a:rPr lang="en-CA" sz="2800" b="1" dirty="0">
-                <a:latin typeface="Roboto Mono" pitchFamily="2" charset="0"/>
-                <a:ea typeface="Roboto Mono" pitchFamily="2" charset="0"/>
-              </a:rPr>
-              <a:t>[0]?</a:t>
-            </a:r>
-          </a:p>
-        </p:txBody>
-      </p:sp>
-    </p:spTree>
-    <p:extLst>
-      <p:ext uri="{BB962C8B-B14F-4D97-AF65-F5344CB8AC3E}">
-        <p14:creationId xmlns:p14="http://schemas.microsoft.com/office/powerpoint/2010/main" val="842828176"/>
-      </p:ext>
-    </p:extLst>
-  </p:cSld>
-  <p:clrMapOvr>
-    <a:masterClrMapping/>
-  </p:clrMapOvr>
-  <mc:AlternateContent xmlns:mc="http://schemas.openxmlformats.org/markup-compatibility/2006" xmlns:p159="http://schemas.microsoft.com/office/powerpoint/2015/09/main">
-    <mc:Choice Requires="p159">
-      <p:transition xmlns:p14="http://schemas.microsoft.com/office/powerpoint/2010/main" spd="slow" p14:dur="2000">
-        <p159:morph option="byChar"/>
-      </p:transition>
-    </mc:Choice>
-    <mc:Fallback xmlns="">
-      <p:transition spd="slow">
-        <p:fade/>
-      </p:transition>
-    </mc:Fallback>
-  </mc:AlternateContent>
 </p:sld>
 </file>
 

</xml_diff>

<commit_message>
Update slides for new semester.
</commit_message>
<xml_diff>
--- a/Slides/QLS-MiCM Data Processing in Python (Part 2) Workshop PPT.pptx
+++ b/Slides/QLS-MiCM Data Processing in Python (Part 2) Workshop PPT.pptx
@@ -237,7 +237,7 @@
           <a:p>
             <a:fld id="{9FF74AA5-8A3E-4FDB-94BB-BF4B31CB4E38}" type="datetimeFigureOut">
               <a:rPr lang="en-CA" smtClean="0"/>
-              <a:t>2025-02-22</a:t>
+              <a:t>2025-07-10</a:t>
             </a:fld>
             <a:endParaRPr lang="en-CA"/>
           </a:p>
@@ -414,7 +414,7 @@
           <a:p>
             <a:fld id="{217E5156-1B5D-054E-B5B2-E1B1BA160252}" type="datetimeFigureOut">
               <a:rPr lang="fr-FR" smtClean="0"/>
-              <a:t>22/02/2025</a:t>
+              <a:t>10/07/2025</a:t>
             </a:fld>
             <a:endParaRPr lang="fr-FR"/>
           </a:p>
@@ -3000,7 +3000,7 @@
               <a:rPr lang="en-CA" sz="1800" dirty="0">
                 <a:latin typeface="Helvetica Light"/>
               </a:rPr>
-              <a:t>February 25, 2025</a:t>
+              <a:t>July 21, 2025</a:t>
             </a:r>
             <a:endParaRPr lang="en-CA" dirty="0">
               <a:latin typeface="Helvetica Light"/>
@@ -13339,13 +13339,13 @@
   <p:clrMapOvr>
     <a:masterClrMapping/>
   </p:clrMapOvr>
-  <mc:AlternateContent xmlns:mc="http://schemas.openxmlformats.org/markup-compatibility/2006">
-    <mc:Choice xmlns:p159="http://schemas.microsoft.com/office/powerpoint/2015/09/main" Requires="p159">
+  <mc:AlternateContent xmlns:mc="http://schemas.openxmlformats.org/markup-compatibility/2006" xmlns:p159="http://schemas.microsoft.com/office/powerpoint/2015/09/main">
+    <mc:Choice Requires="p159">
       <p:transition xmlns:p14="http://schemas.microsoft.com/office/powerpoint/2010/main" spd="slow" p14:dur="2000">
         <p159:morph option="byObject"/>
       </p:transition>
     </mc:Choice>
-    <mc:Fallback>
+    <mc:Fallback xmlns="">
       <p:transition spd="slow">
         <p:fade/>
       </p:transition>
@@ -13987,8 +13987,8 @@
         </p:blipFill>
         <p:spPr>
           <a:xfrm>
-            <a:off x="1049352" y="2046066"/>
-            <a:ext cx="7045294" cy="3224434"/>
+            <a:off x="1296787" y="2147623"/>
+            <a:ext cx="6550424" cy="3021319"/>
           </a:xfrm>
           <a:prstGeom prst="rect">
             <a:avLst/>
@@ -14085,7 +14085,7 @@
         </p:spPr>
         <p:txBody>
           <a:bodyPr>
-            <a:normAutofit lnSpcReduction="10000"/>
+            <a:normAutofit fontScale="92500" lnSpcReduction="10000"/>
           </a:bodyPr>
           <a:lstStyle/>
           <a:p>
@@ -14129,27 +14129,8 @@
                 <a:latin typeface="Arial" panose="020B0604020202020204" pitchFamily="34" charset="0"/>
                 <a:ea typeface="Calibri" panose="020F0502020204030204" pitchFamily="34" charset="0"/>
               </a:rPr>
-              <a:t>In this 4-hour workshop, students will learn basic data processing skills using Python. Attendees will learn how to import code from other modules and packages to take advantage of the existing Python ecosystem. After seeing how to access packages, we will explore popular data analysis packages. We will see how to use NumPy to perform operations on large data arrays and how to use Matplotlib to generate clear data visualisations. Finally, we will discuss how to approach a new, unfamiliar package and learn how to use it.</a:t>
+              <a:t>In this 4-hour workshop, students will learn basic data processing skills using Python. Attendees will learn how to import code from other modules and packages to take advantage of the existing Python ecosystem. After seeing how to access packages, we will explore popular data analysis packages. We will see how to use NumPy to perform operations on large data arrays and how to use Matplotlib to generate clear data visualisations. We will also scratch the surface on using pandas to store data in tables. Along the way, we will discuss how to approach a new, unfamiliar package and learn how to use it.</a:t>
             </a:r>
-            <a:endParaRPr lang="en-CA" sz="1800" dirty="0">
-              <a:effectLst/>
-              <a:latin typeface="Arial" panose="020B0604020202020204" pitchFamily="34" charset="0"/>
-              <a:ea typeface="Arial" panose="020B0604020202020204" pitchFamily="34" charset="0"/>
-            </a:endParaRPr>
-          </a:p>
-          <a:p>
-            <a:pPr marL="0" indent="0">
-              <a:lnSpc>
-                <a:spcPct val="120000"/>
-              </a:lnSpc>
-              <a:spcBef>
-                <a:spcPts val="0"/>
-              </a:spcBef>
-              <a:spcAft>
-                <a:spcPts val="600"/>
-              </a:spcAft>
-              <a:buNone/>
-            </a:pPr>
             <a:endParaRPr lang="en-CA" sz="1800" b="1" dirty="0">
               <a:effectLst/>
               <a:latin typeface="Arial" panose="020B0604020202020204" pitchFamily="34" charset="0"/>
@@ -14256,11 +14237,29 @@
               </a:rPr>
               <a:t>Use Matplotlib to generate different types of plots to visualise data.</a:t>
             </a:r>
-            <a:endParaRPr lang="en-CA" sz="1800" dirty="0">
-              <a:effectLst/>
-              <a:latin typeface="Arial" panose="020B0604020202020204" pitchFamily="34" charset="0"/>
-              <a:ea typeface="Arial" panose="020B0604020202020204" pitchFamily="34" charset="0"/>
-            </a:endParaRPr>
+          </a:p>
+          <a:p>
+            <a:pPr marL="342900" indent="-342900">
+              <a:lnSpc>
+                <a:spcPct val="120000"/>
+              </a:lnSpc>
+              <a:spcBef>
+                <a:spcPts val="0"/>
+              </a:spcBef>
+              <a:spcAft>
+                <a:spcPts val="600"/>
+              </a:spcAft>
+              <a:buFont typeface="+mj-lt"/>
+              <a:buAutoNum type="arabicPeriod"/>
+            </a:pPr>
+            <a:r>
+              <a:rPr lang="en-CA" sz="1800" dirty="0">
+                <a:effectLst/>
+                <a:latin typeface="Arial" panose="020B0604020202020204" pitchFamily="34" charset="0"/>
+                <a:ea typeface="Arial" panose="020B0604020202020204" pitchFamily="34" charset="0"/>
+              </a:rPr>
+              <a:t>Use pandas to represent data stored in tables.</a:t>
+            </a:r>
           </a:p>
           <a:p>
             <a:pPr marL="342900" indent="-342900">

</xml_diff>

<commit_message>
Add facilitator name to slides.
</commit_message>
<xml_diff>
--- a/Slides/QLS-MiCM Data Processing in Python (Part 2) Workshop PPT.pptx
+++ b/Slides/QLS-MiCM Data Processing in Python (Part 2) Workshop PPT.pptx
@@ -237,7 +237,7 @@
           <a:p>
             <a:fld id="{9FF74AA5-8A3E-4FDB-94BB-BF4B31CB4E38}" type="datetimeFigureOut">
               <a:rPr lang="en-CA" smtClean="0"/>
-              <a:t>2025-07-10</a:t>
+              <a:t>2025-07-18</a:t>
             </a:fld>
             <a:endParaRPr lang="en-CA"/>
           </a:p>
@@ -414,7 +414,7 @@
           <a:p>
             <a:fld id="{217E5156-1B5D-054E-B5B2-E1B1BA160252}" type="datetimeFigureOut">
               <a:rPr lang="fr-FR" smtClean="0"/>
-              <a:t>10/07/2025</a:t>
+              <a:t>18/07/2025</a:t>
             </a:fld>
             <a:endParaRPr lang="fr-FR"/>
           </a:p>
@@ -2974,8 +2974,8 @@
         </p:nvSpPr>
         <p:spPr>
           <a:xfrm>
-            <a:off x="80296" y="6075446"/>
-            <a:ext cx="3567878" cy="646331"/>
+            <a:off x="0" y="5699665"/>
+            <a:ext cx="3567878" cy="923330"/>
           </a:xfrm>
           <a:prstGeom prst="rect">
             <a:avLst/>
@@ -2992,7 +2992,15 @@
               <a:rPr lang="en-CA" sz="1800" dirty="0">
                 <a:latin typeface="Helvetica Light"/>
               </a:rPr>
-              <a:t>Benjamin Rudski</a:t>
+              <a:t>Workshop lead: Benjamin Rudski</a:t>
+            </a:r>
+          </a:p>
+          <a:p>
+            <a:r>
+              <a:rPr lang="en-CA" sz="1800" dirty="0">
+                <a:latin typeface="Helvetica Light"/>
+              </a:rPr>
+              <a:t>Facilitator: Peyton McClelland</a:t>
             </a:r>
           </a:p>
           <a:p>

</xml_diff>